<commit_message>
finish with the presentation
</commit_message>
<xml_diff>
--- a/presentation.pptx
+++ b/presentation.pptx
@@ -10,26 +10,17 @@
   <p:sldIdLst>
     <p:sldId id="256" r:id="rId3"/>
     <p:sldId id="257" r:id="rId5"/>
-    <p:sldId id="314" r:id="rId6"/>
-    <p:sldId id="310" r:id="rId7"/>
-    <p:sldId id="311" r:id="rId8"/>
-    <p:sldId id="313" r:id="rId9"/>
-    <p:sldId id="258" r:id="rId10"/>
-    <p:sldId id="283" r:id="rId11"/>
-    <p:sldId id="265" r:id="rId12"/>
-    <p:sldId id="317" r:id="rId13"/>
-    <p:sldId id="274" r:id="rId14"/>
-    <p:sldId id="276" r:id="rId15"/>
-    <p:sldId id="315" r:id="rId16"/>
-    <p:sldId id="316" r:id="rId17"/>
-    <p:sldId id="278" r:id="rId18"/>
-    <p:sldId id="304" r:id="rId19"/>
-    <p:sldId id="288" r:id="rId20"/>
-    <p:sldId id="312" r:id="rId21"/>
-    <p:sldId id="281" r:id="rId22"/>
-    <p:sldId id="307" r:id="rId23"/>
-    <p:sldId id="287" r:id="rId24"/>
-    <p:sldId id="308" r:id="rId25"/>
+    <p:sldId id="311" r:id="rId6"/>
+    <p:sldId id="283" r:id="rId7"/>
+    <p:sldId id="274" r:id="rId8"/>
+    <p:sldId id="316" r:id="rId9"/>
+    <p:sldId id="278" r:id="rId10"/>
+    <p:sldId id="304" r:id="rId11"/>
+    <p:sldId id="288" r:id="rId12"/>
+    <p:sldId id="281" r:id="rId13"/>
+    <p:sldId id="307" r:id="rId14"/>
+    <p:sldId id="287" r:id="rId15"/>
+    <p:sldId id="308" r:id="rId16"/>
   </p:sldIdLst>
   <p:sldSz cx="12192000" cy="6858000"/>
   <p:notesSz cx="6858000" cy="9144000"/>
@@ -565,6 +556,12 @@
         <p:txBody>
           <a:bodyPr/>
           <a:p>
+            <a:r>
+              <a:rPr lang="en-US" altLang="ru-RU">
+                <a:sym typeface="+mn-ea"/>
+              </a:rPr>
+              <a:t>DTLS и SRTP</a:t>
+            </a:r>
             <a:endParaRPr lang="ru-RU" altLang="en-US"/>
           </a:p>
         </p:txBody>
@@ -621,138 +618,6 @@
 </p:notes>
 </file>
 
-<file path=ppt/notesSlides/notesSlide12.xml><?xml version="1.0" encoding="utf-8"?>
-<p:notes xmlns:a="http://schemas.openxmlformats.org/drawingml/2006/main" xmlns:r="http://schemas.openxmlformats.org/officeDocument/2006/relationships" xmlns:p="http://schemas.openxmlformats.org/presentationml/2006/main">
-  <p:cSld>
-    <p:spTree>
-      <p:nvGrpSpPr>
-        <p:cNvPr id="1" name=""/>
-        <p:cNvGrpSpPr/>
-        <p:nvPr/>
-      </p:nvGrpSpPr>
-      <p:grpSpPr/>
-      <p:sp>
-        <p:nvSpPr>
-          <p:cNvPr id="2" name="Замещающий образ слайда 1"/>
-          <p:cNvSpPr/>
-          <p:nvPr>
-            <p:ph type="sldImg" idx="2"/>
-          </p:nvPr>
-        </p:nvSpPr>
-        <p:spPr/>
-      </p:sp>
-      <p:sp>
-        <p:nvSpPr>
-          <p:cNvPr id="3" name="Замещающий текст 2"/>
-          <p:cNvSpPr/>
-          <p:nvPr>
-            <p:ph type="body" idx="3"/>
-          </p:nvPr>
-        </p:nvSpPr>
-        <p:spPr/>
-        <p:txBody>
-          <a:bodyPr/>
-          <a:p>
-            <a:endParaRPr lang="ru-RU" altLang="en-US"/>
-          </a:p>
-        </p:txBody>
-      </p:sp>
-    </p:spTree>
-  </p:cSld>
-  <p:clrMapOvr>
-    <a:masterClrMapping/>
-  </p:clrMapOvr>
-</p:notes>
-</file>
-
-<file path=ppt/notesSlides/notesSlide13.xml><?xml version="1.0" encoding="utf-8"?>
-<p:notes xmlns:a="http://schemas.openxmlformats.org/drawingml/2006/main" xmlns:r="http://schemas.openxmlformats.org/officeDocument/2006/relationships" xmlns:p="http://schemas.openxmlformats.org/presentationml/2006/main">
-  <p:cSld>
-    <p:spTree>
-      <p:nvGrpSpPr>
-        <p:cNvPr id="1" name=""/>
-        <p:cNvGrpSpPr/>
-        <p:nvPr/>
-      </p:nvGrpSpPr>
-      <p:grpSpPr/>
-      <p:sp>
-        <p:nvSpPr>
-          <p:cNvPr id="2" name="Замещающий образ слайда 1"/>
-          <p:cNvSpPr/>
-          <p:nvPr>
-            <p:ph type="sldImg" idx="2"/>
-          </p:nvPr>
-        </p:nvSpPr>
-        <p:spPr/>
-      </p:sp>
-      <p:sp>
-        <p:nvSpPr>
-          <p:cNvPr id="3" name="Замещающий текст 2"/>
-          <p:cNvSpPr/>
-          <p:nvPr>
-            <p:ph type="body" idx="3"/>
-          </p:nvPr>
-        </p:nvSpPr>
-        <p:spPr/>
-        <p:txBody>
-          <a:bodyPr/>
-          <a:p>
-            <a:endParaRPr lang="ru-RU" altLang="en-US"/>
-          </a:p>
-        </p:txBody>
-      </p:sp>
-    </p:spTree>
-  </p:cSld>
-  <p:clrMapOvr>
-    <a:masterClrMapping/>
-  </p:clrMapOvr>
-</p:notes>
-</file>
-
-<file path=ppt/notesSlides/notesSlide14.xml><?xml version="1.0" encoding="utf-8"?>
-<p:notes xmlns:a="http://schemas.openxmlformats.org/drawingml/2006/main" xmlns:r="http://schemas.openxmlformats.org/officeDocument/2006/relationships" xmlns:p="http://schemas.openxmlformats.org/presentationml/2006/main">
-  <p:cSld>
-    <p:spTree>
-      <p:nvGrpSpPr>
-        <p:cNvPr id="1" name=""/>
-        <p:cNvGrpSpPr/>
-        <p:nvPr/>
-      </p:nvGrpSpPr>
-      <p:grpSpPr/>
-      <p:sp>
-        <p:nvSpPr>
-          <p:cNvPr id="2" name="Замещающий образ слайда 1"/>
-          <p:cNvSpPr/>
-          <p:nvPr>
-            <p:ph type="sldImg" idx="2"/>
-          </p:nvPr>
-        </p:nvSpPr>
-        <p:spPr/>
-      </p:sp>
-      <p:sp>
-        <p:nvSpPr>
-          <p:cNvPr id="3" name="Замещающий текст 2"/>
-          <p:cNvSpPr/>
-          <p:nvPr>
-            <p:ph type="body" idx="3"/>
-          </p:nvPr>
-        </p:nvSpPr>
-        <p:spPr/>
-        <p:txBody>
-          <a:bodyPr/>
-          <a:p>
-            <a:endParaRPr lang="ru-RU" altLang="en-US"/>
-          </a:p>
-        </p:txBody>
-      </p:sp>
-    </p:spTree>
-  </p:cSld>
-  <p:clrMapOvr>
-    <a:masterClrMapping/>
-  </p:clrMapOvr>
-</p:notes>
-</file>
-
 <file path=ppt/notesSlides/notesSlide2.xml><?xml version="1.0" encoding="utf-8"?>
 <p:notes xmlns:a="http://schemas.openxmlformats.org/drawingml/2006/main" xmlns:r="http://schemas.openxmlformats.org/officeDocument/2006/relationships" xmlns:p="http://schemas.openxmlformats.org/presentationml/2006/main">
   <p:cSld>
@@ -786,11 +651,11 @@
           <a:bodyPr/>
           <a:p>
             <a:r>
-              <a:rPr lang="" altLang="ru-RU"/>
+              <a:rPr lang="en-US" altLang="ru-RU"/>
               <a:t>Целью данной работы является </a:t>
             </a:r>
             <a:r>
-              <a:rPr lang="" altLang="en-US">
+              <a:rPr lang="en-US" altLang="en-US">
                 <a:sym typeface="+mn-ea"/>
               </a:rPr>
               <a:t>с</a:t>
@@ -823,31 +688,23 @@
               <a:rPr lang="en-US" altLang="ru-RU">
                 <a:sym typeface="+mn-ea"/>
               </a:rPr>
-              <a:t> </a:t>
-            </a:r>
-            <a:r>
-              <a:rPr lang="en-US" altLang="ru-RU">
-                <a:sym typeface="+mn-ea"/>
-              </a:rPr>
-              <a:t>webRTC стандарта </a:t>
-            </a:r>
-            <a:r>
-              <a:rPr lang="en-US" altLang="ru-RU">
-                <a:sym typeface="+mn-ea"/>
-              </a:rPr>
-              <a:t>для установления соединения  и обмена информацией между конечными пользователями.</a:t>
+              <a:t> webRTC стандарта для установления соединения  и обмена информацией между конечными пользователями.</a:t>
             </a:r>
             <a:endParaRPr lang="en-US" altLang="ru-RU"/>
           </a:p>
           <a:p>
-            <a:endParaRPr lang="" altLang="ru-RU"/>
-          </a:p>
-          <a:p>
-            <a:r>
-              <a:rPr lang="" altLang="ru-RU"/>
-              <a:t>Цель данной работы вытекает из того факта, что на сегодняя</a:t>
-            </a:r>
-            <a:endParaRPr lang="" altLang="ru-RU"/>
+            <a:endParaRPr lang="en-US" altLang="ru-RU"/>
+          </a:p>
+          <a:p>
+            <a:r>
+              <a:rPr lang="en-US" altLang="ru-RU"/>
+              <a:t>Цель данной работы вытекает из того факта, что на сегодн</a:t>
+            </a:r>
+            <a:r>
+              <a:rPr lang="" altLang="en-US"/>
+              <a:t>яшний день большинство приложений, выполняющих функцию видеочата подвержены угрозам со стороны злоумышленника, имеют закрытый исходный код, либо имеют какое-либо ограничение в плане кроссплатформенности</a:t>
+            </a:r>
+            <a:endParaRPr lang="" altLang="en-US"/>
           </a:p>
         </p:txBody>
       </p:sp>
@@ -893,43 +750,7 @@
           <a:p>
             <a:r>
               <a:rPr lang="en-US" altLang="ru-RU"/>
-              <a:t>Целью данной работы является </a:t>
-            </a:r>
-            <a:r>
-              <a:rPr lang="en-US" altLang="en-US">
-                <a:sym typeface="+mn-ea"/>
-              </a:rPr>
-              <a:t>с</a:t>
-            </a:r>
-            <a:r>
-              <a:rPr lang="en-US" altLang="ru-RU">
-                <a:sym typeface="+mn-ea"/>
-              </a:rPr>
-              <a:t>оздание </a:t>
-            </a:r>
-            <a:r>
-              <a:rPr lang="en-US" altLang="en-US">
-                <a:sym typeface="+mn-ea"/>
-              </a:rPr>
-              <a:t>видео чата </a:t>
-            </a:r>
-            <a:r>
-              <a:rPr lang="en-US" altLang="ru-RU">
-                <a:sym typeface="+mn-ea"/>
-              </a:rPr>
-              <a:t>на основ</a:t>
-            </a:r>
-            <a:r>
-              <a:rPr lang="en-US" altLang="en-US">
-                <a:sym typeface="+mn-ea"/>
-              </a:rPr>
-              <a:t>е</a:t>
-            </a:r>
-            <a:r>
-              <a:rPr lang="en-US" altLang="ru-RU">
-                <a:sym typeface="+mn-ea"/>
-              </a:rPr>
-              <a:t> webRTC стандарта для установления соединения  и обмена информацией между конечными пользователями.</a:t>
+              <a:t>На данный момент одним из популярных решений создания видео чатов является adobe flash player/</a:t>
             </a:r>
             <a:endParaRPr lang="en-US" altLang="ru-RU"/>
           </a:p>
@@ -939,7 +760,38 @@
           <a:p>
             <a:r>
               <a:rPr lang="en-US" altLang="ru-RU"/>
-              <a:t>Цель данной работы вытекает из того факта, что на сегодняя</a:t>
+              <a:t>Основным недостатком flash-приложений является чрезмерная нагрузка на центральный процессор, Это связано с неэффективностью виртуальной машины Flash Player. Но стоит отметить, что в иногда имеет место тот факт, что flash-приложения недостаточно оптимизированы их разработчиками из-за использования «генераторов» flash-приложений.</a:t>
+            </a:r>
+            <a:endParaRPr lang="en-US" altLang="ru-RU"/>
+          </a:p>
+          <a:p>
+            <a:endParaRPr lang="en-US" altLang="ru-RU"/>
+          </a:p>
+          <a:p>
+            <a:r>
+              <a:rPr lang="en-US" altLang="ru-RU"/>
+              <a:t>Так же к недостаткам можно причислить</a:t>
+            </a:r>
+            <a:endParaRPr lang="en-US" altLang="ru-RU"/>
+          </a:p>
+          <a:p>
+            <a:r>
+              <a:rPr lang="en-US" altLang="ru-RU"/>
+              <a:t>1) Задержка трафика из-за использования протокола RTMP;</a:t>
+            </a:r>
+            <a:endParaRPr lang="en-US" altLang="ru-RU"/>
+          </a:p>
+          <a:p>
+            <a:r>
+              <a:rPr lang="en-US" altLang="ru-RU"/>
+              <a:t>2) Обязательно наличие промежуточного сервера;</a:t>
+            </a:r>
+            <a:endParaRPr lang="en-US" altLang="ru-RU"/>
+          </a:p>
+          <a:p>
+            <a:r>
+              <a:rPr lang="en-US" altLang="ru-RU"/>
+              <a:t>3) Закрытые средства разработки и проигрывания.</a:t>
             </a:r>
             <a:endParaRPr lang="en-US" altLang="ru-RU"/>
           </a:p>
@@ -986,35 +838,50 @@
           <a:bodyPr/>
           <a:p>
             <a:r>
-              <a:rPr lang="" altLang="ru-RU"/>
-              <a:t>Для того, чтобы понять область исследование следует разобраться с тем, что из себ представляет видеочат.</a:t>
-            </a:r>
-            <a:endParaRPr lang="" altLang="ru-RU"/>
-          </a:p>
-          <a:p>
-            <a:r>
-              <a:rPr lang="" altLang="ru-RU"/>
-              <a:t>Видео чат это </a:t>
-            </a:r>
-            <a:r>
-              <a:rPr lang="" altLang="en-US">
-                <a:sym typeface="+mn-ea"/>
-              </a:rPr>
-              <a:t>о</a:t>
-            </a:r>
-            <a:r>
-              <a:rPr lang="en-US">
-                <a:sym typeface="+mn-ea"/>
-              </a:rPr>
-              <a:t>нлайн-сервис, позволяющий пользователям Интернета общаться, в дополнение к текстовой переписке, в аудио и видео (посредством веб-камеры) режиме.</a:t>
-            </a:r>
-            <a:endParaRPr lang="en-US"/>
-          </a:p>
-          <a:p>
-            <a:endParaRPr lang="" altLang="ru-RU"/>
-          </a:p>
-          <a:p>
-            <a:endParaRPr lang="" altLang="ru-RU"/>
+              <a:rPr lang="ru-RU" altLang="en-US"/>
+              <a:t>Первый клиент желает совершить звонок второму клиенту. WebRTC дает всю необходимую информацию, чтобы себя обозначить. Но остается открытым вопрос, как одному браузеру найти другой, как эту метаинформацию переслать, как проинициализировать вызов. </a:t>
+            </a:r>
+            <a:endParaRPr lang="ru-RU" altLang="en-US"/>
+          </a:p>
+          <a:p>
+            <a:endParaRPr lang="ru-RU" altLang="en-US"/>
+          </a:p>
+          <a:p>
+            <a:r>
+              <a:rPr lang="ru-RU" altLang="en-US"/>
+              <a:t>Первый клиент формирует метаинформацию, и с помощью веб-сокетов или HTTP пересылает ее на сигнальный сервер. </a:t>
+            </a:r>
+            <a:endParaRPr lang="ru-RU" altLang="en-US"/>
+          </a:p>
+          <a:p>
+            <a:endParaRPr lang="ru-RU" altLang="en-US"/>
+          </a:p>
+          <a:p>
+            <a:r>
+              <a:rPr lang="ru-RU" altLang="en-US"/>
+              <a:t>Второй клиент берет ее, использует, устанавливает себе, формирует ответ, и с помощью сигнального механизма пересылает ее на сигнальный сервер, тот в свою очередь ретранслирует ее первому клиенту. Таким образом оба клиента в данный момент обладают всей необходимой датой и метаинформацией,  </a:t>
+            </a:r>
+            <a:endParaRPr lang="ru-RU" altLang="en-US"/>
+          </a:p>
+          <a:p>
+            <a:endParaRPr lang="ru-RU" altLang="en-US"/>
+          </a:p>
+          <a:p>
+            <a:r>
+              <a:rPr lang="ru-RU" altLang="en-US"/>
+              <a:t>STUN — это клиент-серверный протокол. Клиент может включать в себя реализацию клиента STUN, который отправляет запрос серверу STUN. Затем сервер STUN отправляет клиенту обратно информацию о том, каков внешний адрес маршрутизатора NAT, и какой порт открыт на NAT для приема входящих запросов обратно во внутреннюю сеть.</a:t>
+            </a:r>
+            <a:endParaRPr lang="ru-RU" altLang="en-US"/>
+          </a:p>
+          <a:p>
+            <a:endParaRPr lang="ru-RU" altLang="en-US"/>
+          </a:p>
+          <a:p>
+            <a:r>
+              <a:rPr lang="ru-RU" altLang="en-US"/>
+              <a:t>Таким образом, в процессе установки P2P соединения, каждый из клиентов должен сделать по запросу к этому STUN-серверу, чтобы узнать свой IP-адрес</a:t>
+            </a:r>
+            <a:endParaRPr lang="ru-RU" altLang="en-US"/>
           </a:p>
         </p:txBody>
       </p:sp>
@@ -1060,48 +927,7 @@
           <a:p>
             <a:r>
               <a:rPr lang="" altLang="ru-RU"/>
-              <a:t>На данный момент одним из популярных решений создания видео чатов является adobe flash player/</a:t>
-            </a:r>
-            <a:endParaRPr lang="" altLang="ru-RU"/>
-          </a:p>
-          <a:p>
-            <a:endParaRPr lang="" altLang="ru-RU"/>
-          </a:p>
-          <a:p>
-            <a:r>
-              <a:rPr lang="" altLang="ru-RU"/>
-              <a:t>Основным недостатком flash-приложений является чрезмерная нагрузка на центральный процессор, Это связано с неэффективностью виртуальной машины Flash Player. Но стоит отметить, что в иногда имеет место тот факт, что flash-приложения недостаточно оптимизированы их разработчиками из-за использования «генераторов» flash-приложений.</a:t>
-            </a:r>
-            <a:endParaRPr lang="" altLang="ru-RU"/>
-          </a:p>
-          <a:p>
-            <a:endParaRPr lang="" altLang="ru-RU"/>
-          </a:p>
-          <a:p>
-            <a:r>
-              <a:rPr lang="" altLang="ru-RU"/>
-              <a:t>Так же к недостаткам можно причислить</a:t>
-            </a:r>
-            <a:endParaRPr lang="" altLang="ru-RU"/>
-          </a:p>
-          <a:p>
-            <a:r>
-              <a:rPr lang="" altLang="ru-RU"/>
-              <a:t>1) Задержка трафика из-за использования протокола RTMP;</a:t>
-            </a:r>
-            <a:endParaRPr lang="" altLang="ru-RU"/>
-          </a:p>
-          <a:p>
-            <a:r>
-              <a:rPr lang="" altLang="ru-RU"/>
-              <a:t>2) Обязательно наличие промежуточного сервера;</a:t>
-            </a:r>
-            <a:endParaRPr lang="" altLang="ru-RU"/>
-          </a:p>
-          <a:p>
-            <a:r>
-              <a:rPr lang="" altLang="ru-RU"/>
-              <a:t>3) Закрытые средства разработки и проигрывания.</a:t>
+              <a:t>На данном слайде представлен интерфейс приложения</a:t>
             </a:r>
             <a:endParaRPr lang="" altLang="ru-RU"/>
           </a:p>
@@ -1147,62 +973,7 @@
         <p:txBody>
           <a:bodyPr/>
           <a:p>
-            <a:r>
-              <a:rPr lang="en-US" altLang="ru-RU"/>
-              <a:t>В реализациях Adobe Flash время от времени находят </a:t>
-            </a:r>
-            <a:r>
-              <a:rPr lang="" altLang="en-US"/>
-              <a:t>уязвимости</a:t>
-            </a:r>
-            <a:r>
-              <a:rPr lang="en-US" altLang="ru-RU"/>
-              <a:t>, позволяющие злоумышленникам производить разнообразные действия с системой. </a:t>
-            </a:r>
-            <a:endParaRPr lang="en-US" altLang="ru-RU"/>
-          </a:p>
-          <a:p>
-            <a:endParaRPr lang="en-US" altLang="ru-RU"/>
-          </a:p>
-          <a:p>
-            <a:r>
-              <a:rPr lang="" altLang="en-US"/>
-              <a:t>В</a:t>
-            </a:r>
-            <a:r>
-              <a:rPr lang="en-US" altLang="ru-RU"/>
-              <a:t> </a:t>
-            </a:r>
-            <a:r>
-              <a:rPr lang="" altLang="en-US"/>
-              <a:t>ноябре </a:t>
-            </a:r>
-            <a:r>
-              <a:rPr lang="en-US" altLang="ru-RU"/>
-              <a:t>20</a:t>
-            </a:r>
-            <a:r>
-              <a:rPr lang="" altLang="en-US"/>
-              <a:t>16</a:t>
-            </a:r>
-            <a:r>
-              <a:rPr lang="en-US" altLang="ru-RU"/>
-              <a:t> года была найдена уязвимость, позволяющая удалённо управлять веб-камерой и микрофоном.</a:t>
-            </a:r>
-            <a:endParaRPr lang="en-US" altLang="ru-RU"/>
-          </a:p>
-          <a:p>
-            <a:endParaRPr lang="en-US" altLang="ru-RU"/>
-          </a:p>
-          <a:p>
-            <a:r>
-              <a:rPr lang="en-US" altLang="ru-RU"/>
-              <a:t>В октябре 2015 года в плагине Adobe Flash Player была найдена уязвимость, с помощью которой вредоносное программное обеспечение способно встраиваться в протоколы проигрывателя и проникать на компьютеры жертв. </a:t>
-            </a:r>
-            <a:endParaRPr lang="en-US" altLang="ru-RU"/>
-          </a:p>
-          <a:p>
-            <a:endParaRPr lang="en-US" altLang="ru-RU"/>
+            <a:endParaRPr lang="" altLang="ru-RU"/>
           </a:p>
         </p:txBody>
       </p:sp>
@@ -1247,68 +1018,20 @@
           <a:bodyPr/>
           <a:p>
             <a:r>
-              <a:rPr lang="" altLang="ru-RU"/>
-              <a:t>А теперь немного подробнее рассмотрим и остановимся на webrtc стандарте для передачи потоковых данных</a:t>
-            </a:r>
-            <a:endParaRPr lang="" altLang="ru-RU"/>
-          </a:p>
-          <a:p>
-            <a:endParaRPr lang="" altLang="ru-RU"/>
-          </a:p>
-          <a:p>
-            <a:r>
-              <a:rPr lang="ru-RU" altLang="en-US">
-                <a:sym typeface="+mn-ea"/>
-              </a:rPr>
-              <a:t>WebRTC - </a:t>
-            </a:r>
-            <a:r>
-              <a:rPr lang="en-US" altLang="ru-RU">
-                <a:sym typeface="+mn-ea"/>
-              </a:rPr>
-              <a:t>стандарт</a:t>
-            </a:r>
-            <a:r>
-              <a:rPr lang="ru-RU" altLang="en-US">
-                <a:sym typeface="+mn-ea"/>
-              </a:rPr>
-              <a:t>, </a:t>
-            </a:r>
-            <a:r>
-              <a:rPr lang="en-US" altLang="ru-RU">
-                <a:sym typeface="+mn-ea"/>
-              </a:rPr>
-              <a:t>позволяющий</a:t>
-            </a:r>
-            <a:r>
-              <a:rPr lang="ru-RU" altLang="en-US">
-                <a:sym typeface="+mn-ea"/>
-              </a:rPr>
-              <a:t>  построить соединение в режиме узел-узел</a:t>
-            </a:r>
-            <a:r>
-              <a:rPr lang="en-US" altLang="ru-RU">
-                <a:sym typeface="+mn-ea"/>
-              </a:rPr>
-              <a:t>, </a:t>
-            </a:r>
-            <a:r>
-              <a:rPr lang="ru-RU" altLang="en-US">
-                <a:sym typeface="+mn-ea"/>
-              </a:rPr>
-              <a:t>захватывать и вещать аудио и видео медиа-потоки, а также передавать между браузерами произвольные данные, без обязательного использования посредников. </a:t>
+              <a:rPr lang="ru-RU" altLang="en-US"/>
+              <a:t>Центральным объектом в API служит RTCPeerConnection. Когда выполняется соединение, то берем класс RTCPeerConnection, который возвращает объект peerConnection. В качестве конфигурации указывается набор ICE-серверов, то есть STUN- и TURN-серверов, к которым клиент будет обращаться в процессе установки. И есть важный ивент onicecandidate, который триггерится каждый раз, когда клиенту нужна помощь сигнального механизма. То есть технология WebRTC сделала запрос, например, к STUN-серверу, клиент узнал свой внешний IP-адрес, появился новый сформированный ICECandidate, и нужно переслать его с помощью стороннего механизма, ивент стриггерился.</a:t>
             </a:r>
             <a:endParaRPr lang="ru-RU" altLang="en-US"/>
           </a:p>
           <a:p>
-            <a:endParaRPr lang="" altLang="ru-RU"/>
-          </a:p>
-          <a:p>
-            <a:r>
-              <a:rPr lang="" altLang="ru-RU"/>
-              <a:t>Webrtc использует уже SRTP (Secure Real-time Transport Protocol) протокол передачи данных, который предназначен для шифрования, установления подлинности сообщения, целостности,</a:t>
-            </a:r>
-            <a:endParaRPr lang="" altLang="ru-RU"/>
+            <a:endParaRPr lang="ru-RU" altLang="en-US"/>
+          </a:p>
+          <a:p>
+            <a:r>
+              <a:rPr lang="ru-RU" altLang="en-US"/>
+              <a:t>Когда устанавливается соединение и требуется проинициализировать вызов, то используется метод createOffer(), чтобы сформировать начальную SDP, offer SDP, ту самую мета-информацию, которую нужно переслать другому участнику системы.</a:t>
+            </a:r>
+            <a:endParaRPr lang="ru-RU" altLang="en-US"/>
           </a:p>
         </p:txBody>
       </p:sp>
@@ -1354,7 +1077,7 @@
           <a:p>
             <a:r>
               <a:rPr lang="ru-RU" altLang="en-US"/>
-              <a:t>Первый клиент желает совершить звонок второму клиенту. WebRTC дает всю необходимую информацию, чтобы себя обозначить. Но остается открытым вопрос, как одному браузеру найти другой, как эту метаинформацию переслать, как проинициализировать вызов. </a:t>
+              <a:t>Когда клиент получил доступ к медиапотоку, он может его передать в уже имеющееся P2P-соединение с помощью метода addStream, а другой клиент узнает об этом, у него стриггерится ивент onaddstream. Он получит наш поток и сможет его отобразить.</a:t>
             </a:r>
             <a:endParaRPr lang="ru-RU" altLang="en-US"/>
           </a:p>
@@ -1364,37 +1087,7 @@
           <a:p>
             <a:r>
               <a:rPr lang="ru-RU" altLang="en-US"/>
-              <a:t>Первый клиент формирует метаинформацию, и с помощью веб-сокетов или HTTP пересылает ее на сигнальный сервер. </a:t>
-            </a:r>
-            <a:endParaRPr lang="ru-RU" altLang="en-US"/>
-          </a:p>
-          <a:p>
-            <a:endParaRPr lang="ru-RU" altLang="en-US"/>
-          </a:p>
-          <a:p>
-            <a:r>
-              <a:rPr lang="ru-RU" altLang="en-US"/>
-              <a:t>Второй клиент берет ее, использует, устанавливает себе, формирует ответ, и с помощью сигнального механизма пересылает ее на сигнальный сервер, тот в свою очередь ретранслирует ее первому клиенту. Таким образом оба клиента в данный момент обладают всей необходимой датой и метаинформацией,  </a:t>
-            </a:r>
-            <a:endParaRPr lang="ru-RU" altLang="en-US"/>
-          </a:p>
-          <a:p>
-            <a:endParaRPr lang="ru-RU" altLang="en-US"/>
-          </a:p>
-          <a:p>
-            <a:r>
-              <a:rPr lang="ru-RU" altLang="en-US"/>
-              <a:t>STUN — это клиент-серверный протокол. Клиент может включать в себя реализацию клиента STUN, который отправляет запрос серверу STUN. Затем сервер STUN отправляет клиенту обратно информацию о том, каков внешний адрес маршрутизатора NAT, и какой порт открыт на NAT для приема входящих запросов обратно во внутреннюю сеть.</a:t>
-            </a:r>
-            <a:endParaRPr lang="ru-RU" altLang="en-US"/>
-          </a:p>
-          <a:p>
-            <a:endParaRPr lang="ru-RU" altLang="en-US"/>
-          </a:p>
-          <a:p>
-            <a:r>
-              <a:rPr lang="ru-RU" altLang="en-US"/>
-              <a:t>Таким образом, в процессе установки P2P соединения, каждый из клиентов должен сделать по запросу к этому STUN-серверу, чтобы узнать свой IP-адрес</a:t>
+              <a:t>Существует метод getUserMedia, который принимает на вход набор констрейнтов. Это специальный объект, где клиент указывает, к каким именно устройствам он хочет получить доступ, к какой именно камере, к какому микрофону.</a:t>
             </a:r>
             <a:endParaRPr lang="ru-RU" altLang="en-US"/>
           </a:p>
@@ -4285,7 +3978,7 @@
               <a:t>Разработка защищенного видеочата на основе стандарта </a:t>
             </a:r>
             <a:r>
-              <a:rPr lang="" altLang="en-US" sz="5000"/>
+              <a:rPr lang="en-US" altLang="en-US" sz="5000"/>
               <a:t>w</a:t>
             </a:r>
             <a:r>
@@ -4319,26 +4012,26 @@
           <a:p>
             <a:pPr algn="l"/>
             <a:r>
-              <a:rPr lang="" altLang="en-US"/>
+              <a:rPr lang="en-US" altLang="en-US"/>
               <a:t>Научный руководитель</a:t>
             </a:r>
-            <a:endParaRPr lang="" altLang="en-US"/>
+            <a:endParaRPr lang="en-US" altLang="en-US"/>
           </a:p>
           <a:p>
             <a:pPr algn="l"/>
             <a:r>
-              <a:rPr lang="" altLang="en-US"/>
+              <a:rPr lang="en-US" altLang="en-US"/>
               <a:t>к.т.н. , доцент</a:t>
             </a:r>
-            <a:endParaRPr lang="" altLang="en-US"/>
+            <a:endParaRPr lang="en-US" altLang="en-US"/>
           </a:p>
           <a:p>
             <a:pPr algn="l"/>
             <a:r>
-              <a:rPr lang="" altLang="en-US"/>
+              <a:rPr lang="en-US" altLang="en-US"/>
               <a:t>Ревякина Елена Александровна</a:t>
             </a:r>
-            <a:endParaRPr lang="" altLang="en-US"/>
+            <a:endParaRPr lang="en-US" altLang="en-US"/>
           </a:p>
         </p:txBody>
       </p:sp>
@@ -4365,19 +4058,19 @@
           <a:p>
             <a:pPr algn="r"/>
             <a:r>
-              <a:rPr lang="" altLang="en-US" sz="2400">
+              <a:rPr lang="en-US" altLang="en-US" sz="2400">
                 <a:sym typeface="+mn-ea"/>
               </a:rPr>
               <a:t>Выполнил</a:t>
             </a:r>
-            <a:endParaRPr lang="" altLang="en-US" sz="2400">
+            <a:endParaRPr lang="en-US" altLang="en-US" sz="2400">
               <a:sym typeface="+mn-ea"/>
             </a:endParaRPr>
           </a:p>
           <a:p>
             <a:pPr algn="r"/>
             <a:r>
-              <a:rPr lang="" altLang="en-US" sz="2400">
+              <a:rPr lang="en-US" altLang="en-US" sz="2400">
                 <a:sym typeface="+mn-ea"/>
               </a:rPr>
               <a:t>студент группы ВКБ62</a:t>
@@ -4387,12 +4080,12 @@
           <a:p>
             <a:pPr algn="r"/>
             <a:r>
-              <a:rPr lang="" altLang="en-US" sz="2400">
+              <a:rPr lang="en-US" altLang="en-US" sz="2400">
                 <a:sym typeface="+mn-ea"/>
               </a:rPr>
               <a:t>Стариков Владислав Эдуардович</a:t>
             </a:r>
-            <a:endParaRPr lang="" altLang="en-US" sz="2400">
+            <a:endParaRPr lang="en-US" altLang="en-US" sz="2400">
               <a:sym typeface="+mn-ea"/>
             </a:endParaRPr>
           </a:p>
@@ -4514,1320 +4207,15 @@
             <p:ph type="title"/>
           </p:nvPr>
         </p:nvSpPr>
-        <p:spPr>
-          <a:xfrm>
-            <a:off x="838200" y="2766060"/>
-            <a:ext cx="10515600" cy="1325563"/>
-          </a:xfrm>
-        </p:spPr>
+        <p:spPr/>
         <p:txBody>
           <a:bodyPr/>
           <a:p>
             <a:r>
-              <a:rPr lang="" altLang="en-US"/>
-              <a:t>Реализация видео чата</a:t>
-            </a:r>
-            <a:endParaRPr lang="" altLang="en-US"/>
-          </a:p>
-        </p:txBody>
-      </p:sp>
-    </p:spTree>
-  </p:cSld>
-  <p:clrMapOvr>
-    <a:masterClrMapping/>
-  </p:clrMapOvr>
-</p:sld>
-</file>
-
-<file path=ppt/slides/slide11.xml><?xml version="1.0" encoding="utf-8"?>
-<p:sld xmlns:a="http://schemas.openxmlformats.org/drawingml/2006/main" xmlns:r="http://schemas.openxmlformats.org/officeDocument/2006/relationships" xmlns:p="http://schemas.openxmlformats.org/presentationml/2006/main">
-  <p:cSld>
-    <p:spTree>
-      <p:nvGrpSpPr>
-        <p:cNvPr id="1" name=""/>
-        <p:cNvGrpSpPr/>
-        <p:nvPr/>
-      </p:nvGrpSpPr>
-      <p:grpSpPr/>
-      <p:sp>
-        <p:nvSpPr>
-          <p:cNvPr id="2" name="Заголовок 1"/>
-          <p:cNvSpPr>
-            <a:spLocks noGrp="1"/>
-          </p:cNvSpPr>
-          <p:nvPr>
-            <p:ph type="title"/>
-          </p:nvPr>
-        </p:nvSpPr>
-        <p:spPr/>
-        <p:txBody>
-          <a:bodyPr/>
-          <a:p>
-            <a:r>
-              <a:rPr lang="en-US" altLang="en-US"/>
-              <a:t>Интерфейс приложения</a:t>
-            </a:r>
-            <a:endParaRPr lang="en-US" altLang="en-US"/>
-          </a:p>
-        </p:txBody>
-      </p:sp>
-      <p:pic>
-        <p:nvPicPr>
-          <p:cNvPr id="6" name="Замещающее содержимое 5"/>
-          <p:cNvPicPr>
-            <a:picLocks noChangeAspect="1"/>
-          </p:cNvPicPr>
-          <p:nvPr>
-            <p:ph idx="1"/>
-          </p:nvPr>
-        </p:nvPicPr>
-        <p:blipFill>
-          <a:blip r:embed="rId1"/>
-          <a:stretch>
-            <a:fillRect/>
-          </a:stretch>
-        </p:blipFill>
-        <p:spPr>
-          <a:xfrm>
-            <a:off x="1198880" y="2051685"/>
-            <a:ext cx="10100310" cy="4021455"/>
-          </a:xfrm>
-          <a:prstGeom prst="rect">
-            <a:avLst/>
-          </a:prstGeom>
-        </p:spPr>
-      </p:pic>
-    </p:spTree>
-  </p:cSld>
-  <p:clrMapOvr>
-    <a:masterClrMapping/>
-  </p:clrMapOvr>
-</p:sld>
-</file>
-
-<file path=ppt/slides/slide12.xml><?xml version="1.0" encoding="utf-8"?>
-<p:sld xmlns:a="http://schemas.openxmlformats.org/drawingml/2006/main" xmlns:r="http://schemas.openxmlformats.org/officeDocument/2006/relationships" xmlns:p="http://schemas.openxmlformats.org/presentationml/2006/main">
-  <p:cSld>
-    <p:spTree>
-      <p:nvGrpSpPr>
-        <p:cNvPr id="1" name=""/>
-        <p:cNvGrpSpPr/>
-        <p:nvPr/>
-      </p:nvGrpSpPr>
-      <p:grpSpPr/>
-      <p:sp>
-        <p:nvSpPr>
-          <p:cNvPr id="2" name="Заголовок 1"/>
-          <p:cNvSpPr>
-            <a:spLocks noGrp="1"/>
-          </p:cNvSpPr>
-          <p:nvPr>
-            <p:ph type="title"/>
-          </p:nvPr>
-        </p:nvSpPr>
-        <p:spPr/>
-        <p:txBody>
-          <a:bodyPr/>
-          <a:p>
-            <a:r>
-              <a:rPr lang="" altLang="en-US"/>
-              <a:t>Демонстрация работы программы</a:t>
-            </a:r>
-            <a:endParaRPr lang="" altLang="en-US"/>
-          </a:p>
-        </p:txBody>
-      </p:sp>
-      <p:pic>
-        <p:nvPicPr>
-          <p:cNvPr id="4" name="Изображение 3"/>
-          <p:cNvPicPr>
-            <a:picLocks noChangeAspect="1"/>
-          </p:cNvPicPr>
-          <p:nvPr>
-            <p:ph idx="1"/>
-          </p:nvPr>
-        </p:nvPicPr>
-        <p:blipFill>
-          <a:blip r:embed="rId1"/>
-          <a:stretch>
-            <a:fillRect/>
-          </a:stretch>
-        </p:blipFill>
-        <p:spPr>
-          <a:xfrm>
-            <a:off x="3339465" y="2032635"/>
-            <a:ext cx="4958080" cy="4351655"/>
-          </a:xfrm>
-          <a:prstGeom prst="rect">
-            <a:avLst/>
-          </a:prstGeom>
-          <a:noFill/>
-          <a:ln>
-            <a:noFill/>
-          </a:ln>
-        </p:spPr>
-      </p:pic>
-      <p:pic>
-        <p:nvPicPr>
-          <p:cNvPr id="6" name="Изображение 5"/>
-          <p:cNvPicPr>
-            <a:picLocks noChangeAspect="1"/>
-          </p:cNvPicPr>
-          <p:nvPr/>
-        </p:nvPicPr>
-        <p:blipFill>
-          <a:blip r:embed="rId2"/>
-          <a:stretch>
-            <a:fillRect/>
-          </a:stretch>
-        </p:blipFill>
-        <p:spPr>
-          <a:xfrm>
-            <a:off x="1898650" y="1691005"/>
-            <a:ext cx="8394700" cy="4650105"/>
-          </a:xfrm>
-          <a:prstGeom prst="rect">
-            <a:avLst/>
-          </a:prstGeom>
-        </p:spPr>
-      </p:pic>
-    </p:spTree>
-  </p:cSld>
-  <p:clrMapOvr>
-    <a:masterClrMapping/>
-  </p:clrMapOvr>
-</p:sld>
-</file>
-
-<file path=ppt/slides/slide13.xml><?xml version="1.0" encoding="utf-8"?>
-<p:sld xmlns:a="http://schemas.openxmlformats.org/drawingml/2006/main" xmlns:r="http://schemas.openxmlformats.org/officeDocument/2006/relationships" xmlns:p="http://schemas.openxmlformats.org/presentationml/2006/main">
-  <p:cSld>
-    <p:spTree>
-      <p:nvGrpSpPr>
-        <p:cNvPr id="1" name=""/>
-        <p:cNvGrpSpPr/>
-        <p:nvPr/>
-      </p:nvGrpSpPr>
-      <p:grpSpPr/>
-      <p:sp>
-        <p:nvSpPr>
-          <p:cNvPr id="2" name="Заголовок 1"/>
-          <p:cNvSpPr>
-            <a:spLocks noGrp="1"/>
-          </p:cNvSpPr>
-          <p:nvPr>
-            <p:ph type="title"/>
-          </p:nvPr>
-        </p:nvSpPr>
-        <p:spPr/>
-        <p:txBody>
-          <a:bodyPr/>
-          <a:p>
-            <a:r>
-              <a:rPr lang="en-US" altLang="en-US">
-                <a:sym typeface="+mn-ea"/>
-              </a:rPr>
-              <a:t>Демонстрация работы программы</a:t>
-            </a:r>
-            <a:endParaRPr lang="en-US" altLang="en-US"/>
-          </a:p>
-        </p:txBody>
-      </p:sp>
-      <p:pic>
-        <p:nvPicPr>
-          <p:cNvPr id="5" name="Замещающее содержимое 4"/>
-          <p:cNvPicPr>
-            <a:picLocks noChangeAspect="1"/>
-          </p:cNvPicPr>
-          <p:nvPr>
-            <p:ph idx="1"/>
-          </p:nvPr>
-        </p:nvPicPr>
-        <p:blipFill>
-          <a:blip r:embed="rId1"/>
-          <a:stretch>
-            <a:fillRect/>
-          </a:stretch>
-        </p:blipFill>
-        <p:spPr>
-          <a:xfrm>
-            <a:off x="2172970" y="1825625"/>
-            <a:ext cx="7844790" cy="4351655"/>
-          </a:xfrm>
-          <a:prstGeom prst="rect">
-            <a:avLst/>
-          </a:prstGeom>
-        </p:spPr>
-      </p:pic>
-    </p:spTree>
-  </p:cSld>
-  <p:clrMapOvr>
-    <a:masterClrMapping/>
-  </p:clrMapOvr>
-</p:sld>
-</file>
-
-<file path=ppt/slides/slide14.xml><?xml version="1.0" encoding="utf-8"?>
-<p:sld xmlns:a="http://schemas.openxmlformats.org/drawingml/2006/main" xmlns:r="http://schemas.openxmlformats.org/officeDocument/2006/relationships" xmlns:p="http://schemas.openxmlformats.org/presentationml/2006/main">
-  <p:cSld>
-    <p:spTree>
-      <p:nvGrpSpPr>
-        <p:cNvPr id="1" name=""/>
-        <p:cNvGrpSpPr/>
-        <p:nvPr/>
-      </p:nvGrpSpPr>
-      <p:grpSpPr/>
-      <p:sp>
-        <p:nvSpPr>
-          <p:cNvPr id="2" name="Заголовок 1"/>
-          <p:cNvSpPr>
-            <a:spLocks noGrp="1"/>
-          </p:cNvSpPr>
-          <p:nvPr>
-            <p:ph type="title"/>
-          </p:nvPr>
-        </p:nvSpPr>
-        <p:spPr/>
-        <p:txBody>
-          <a:bodyPr/>
-          <a:p>
-            <a:r>
-              <a:rPr lang="en-US" altLang="en-US">
-                <a:sym typeface="+mn-ea"/>
-              </a:rPr>
-              <a:t>Демонстрация работы программы</a:t>
-            </a:r>
-            <a:endParaRPr lang="en-US" altLang="en-US"/>
-          </a:p>
-        </p:txBody>
-      </p:sp>
-      <p:pic>
-        <p:nvPicPr>
-          <p:cNvPr id="7" name="simplescreenrecorder-2019-11-19_17.38.14">
-            <a:hlinkClick r:id="" action="ppaction://media"/>
-          </p:cNvPr>
-          <p:cNvPicPr/>
-          <p:nvPr>
-            <p:ph idx="1"/>
-            <a:videoFile r:link="rId1"/>
-            <p:extLst>
-              <p:ext uri="{DAA4B4D4-6D71-4841-9C94-3DE7FCFB9230}">
-                <p14:media xmlns:p14="http://schemas.microsoft.com/office/powerpoint/2010/main" r:link="rId2"/>
-              </p:ext>
-            </p:extLst>
-          </p:nvPr>
-        </p:nvPicPr>
-        <p:blipFill>
-          <a:blip r:embed="rId3"/>
-          <a:stretch>
-            <a:fillRect/>
-          </a:stretch>
-        </p:blipFill>
-        <p:spPr>
-          <a:xfrm>
-            <a:off x="2325992" y="1844675"/>
-            <a:ext cx="7540017" cy="4351338"/>
-          </a:xfrm>
-          <a:prstGeom prst="rect">
-            <a:avLst/>
-          </a:prstGeom>
-        </p:spPr>
-      </p:pic>
-      <p:sp>
-        <p:nvSpPr>
-          <p:cNvPr id="8" name="Прямоугольник 7"/>
-          <p:cNvSpPr/>
-          <p:nvPr/>
-        </p:nvSpPr>
-        <p:spPr>
-          <a:xfrm>
-            <a:off x="9723120" y="1651635"/>
-            <a:ext cx="937895" cy="4738370"/>
-          </a:xfrm>
-          <a:prstGeom prst="rect">
-            <a:avLst/>
-          </a:prstGeom>
-          <a:solidFill>
-            <a:schemeClr val="bg1"/>
-          </a:solidFill>
-          <a:ln>
-            <a:noFill/>
-          </a:ln>
-        </p:spPr>
-        <p:style>
-          <a:lnRef idx="2">
-            <a:schemeClr val="accent1">
-              <a:shade val="50000"/>
-            </a:schemeClr>
-          </a:lnRef>
-          <a:fillRef idx="1">
-            <a:schemeClr val="accent1"/>
-          </a:fillRef>
-          <a:effectRef idx="0">
-            <a:schemeClr val="accent1"/>
-          </a:effectRef>
-          <a:fontRef idx="minor">
-            <a:schemeClr val="lt1"/>
-          </a:fontRef>
-        </p:style>
-        <p:txBody>
-          <a:bodyPr rtlCol="0" anchor="ctr"/>
-          <a:p>
-            <a:pPr algn="ctr"/>
-            <a:endParaRPr lang="ru-RU" altLang="en-US"/>
-          </a:p>
-        </p:txBody>
-      </p:sp>
-    </p:spTree>
-  </p:cSld>
-  <p:clrMapOvr>
-    <a:masterClrMapping/>
-  </p:clrMapOvr>
-  <p:timing>
-    <p:tnLst>
-      <p:par>
-        <p:cTn id="1" dur="indefinite" restart="never" nodeType="tmRoot">
-          <p:childTnLst>
-            <p:video fullScrn="0">
-              <p:cMediaNode>
-                <p:cTn id="2" fill="hold" display="1">
-                  <p:stCondLst>
-                    <p:cond delay="indefinite"/>
-                  </p:stCondLst>
-                  <p:endCondLst>
-                    <p:cond evt="onNext">
-                      <p:tgtEl>
-                        <p:sldTgt/>
-                      </p:tgtEl>
-                    </p:cond>
-                    <p:cond evt="onPrev">
-                      <p:tgtEl>
-                        <p:sldTgt/>
-                      </p:tgtEl>
-                    </p:cond>
-                  </p:endCondLst>
-                </p:cTn>
-                <p:tgtEl>
-                  <p:spTgt spid="7"/>
-                </p:tgtEl>
-              </p:cMediaNode>
-            </p:video>
-            <p:seq concurrent="1" nextAc="seek">
-              <p:cTn id="3" restart="whenNotActive" fill="hold" evtFilter="cancelBubble" nodeType="interactiveSeq">
-                <p:stCondLst>
-                  <p:cond evt="onClick" delay="0">
-                    <p:tgtEl>
-                      <p:spTgt spid="7"/>
-                    </p:tgtEl>
-                  </p:cond>
-                </p:stCondLst>
-                <p:endSync evt="end" delay="0">
-                  <p:rtn val="all"/>
-                </p:endSync>
-                <p:childTnLst>
-                  <p:par>
-                    <p:cTn id="4" fill="hold">
-                      <p:stCondLst>
-                        <p:cond delay="0"/>
-                      </p:stCondLst>
-                      <p:childTnLst>
-                        <p:par>
-                          <p:cTn id="5" fill="hold">
-                            <p:stCondLst>
-                              <p:cond delay="0"/>
-                            </p:stCondLst>
-                            <p:childTnLst>
-                              <p:par>
-                                <p:cTn id="6" presetID="2" presetClass="mediacall" presetSubtype="0" fill="hold" nodeType="clickEffect">
-                                  <p:stCondLst>
-                                    <p:cond delay="0"/>
-                                  </p:stCondLst>
-                                  <p:childTnLst>
-                                    <p:cmd type="call" cmd="togglePause">
-                                      <p:cBhvr additive="base">
-                                        <p:cTn id="7" dur="1" fill="hold"/>
-                                        <p:tgtEl>
-                                          <p:spTgt spid="7"/>
-                                        </p:tgtEl>
-                                      </p:cBhvr>
-                                    </p:cmd>
-                                  </p:childTnLst>
-                                </p:cTn>
-                              </p:par>
-                            </p:childTnLst>
-                          </p:cTn>
-                        </p:par>
-                      </p:childTnLst>
-                    </p:cTn>
-                  </p:par>
-                </p:childTnLst>
-              </p:cTn>
-              <p:nextCondLst>
-                <p:cond evt="onClick" delay="0">
-                  <p:tgtEl>
-                    <p:spTgt spid="7"/>
-                  </p:tgtEl>
-                </p:cond>
-              </p:nextCondLst>
-            </p:seq>
-          </p:childTnLst>
-        </p:cTn>
-      </p:par>
-    </p:tnLst>
-  </p:timing>
-</p:sld>
-</file>
-
-<file path=ppt/slides/slide15.xml><?xml version="1.0" encoding="utf-8"?>
-<p:sld xmlns:a="http://schemas.openxmlformats.org/drawingml/2006/main" xmlns:r="http://schemas.openxmlformats.org/officeDocument/2006/relationships" xmlns:p="http://schemas.openxmlformats.org/presentationml/2006/main">
-  <p:cSld>
-    <p:spTree>
-      <p:nvGrpSpPr>
-        <p:cNvPr id="1" name=""/>
-        <p:cNvGrpSpPr/>
-        <p:nvPr/>
-      </p:nvGrpSpPr>
-      <p:grpSpPr/>
-      <p:sp>
-        <p:nvSpPr>
-          <p:cNvPr id="2" name="Заголовок 1"/>
-          <p:cNvSpPr>
-            <a:spLocks noGrp="1"/>
-          </p:cNvSpPr>
-          <p:nvPr>
-            <p:ph type="title"/>
-          </p:nvPr>
-        </p:nvSpPr>
-        <p:spPr/>
-        <p:txBody>
-          <a:bodyPr/>
-          <a:p>
-            <a:r>
-              <a:rPr lang="" altLang="en-US"/>
-              <a:t>Реализованные функции программы</a:t>
-            </a:r>
-            <a:endParaRPr lang="" altLang="en-US"/>
-          </a:p>
-        </p:txBody>
-      </p:sp>
-      <p:pic>
-        <p:nvPicPr>
-          <p:cNvPr id="48" name="Изображение 16"/>
-          <p:cNvPicPr>
-            <a:picLocks noChangeAspect="1"/>
-          </p:cNvPicPr>
-          <p:nvPr>
-            <p:ph idx="1"/>
-          </p:nvPr>
-        </p:nvPicPr>
-        <p:blipFill>
-          <a:blip r:embed="rId1"/>
-          <a:stretch>
-            <a:fillRect/>
-          </a:stretch>
-        </p:blipFill>
-        <p:spPr>
-          <a:xfrm>
-            <a:off x="6910070" y="1564005"/>
-            <a:ext cx="4267200" cy="2849245"/>
-          </a:xfrm>
-          <a:prstGeom prst="rect">
-            <a:avLst/>
-          </a:prstGeom>
-          <a:noFill/>
-          <a:ln>
-            <a:noFill/>
-          </a:ln>
-        </p:spPr>
-      </p:pic>
-      <p:sp>
-        <p:nvSpPr>
-          <p:cNvPr id="6" name="Текстовое поле 5"/>
-          <p:cNvSpPr txBox="1"/>
-          <p:nvPr/>
-        </p:nvSpPr>
-        <p:spPr>
-          <a:xfrm>
-            <a:off x="7310120" y="4413250"/>
-            <a:ext cx="2943225" cy="368300"/>
-          </a:xfrm>
-          <a:prstGeom prst="rect">
-            <a:avLst/>
-          </a:prstGeom>
-          <a:noFill/>
-        </p:spPr>
-        <p:txBody>
-          <a:bodyPr wrap="none" rtlCol="0" anchor="t">
-            <a:spAutoFit/>
-          </a:bodyPr>
-          <a:p>
-            <a:r>
-              <a:rPr lang="en-US" altLang="en-US">
-                <a:sym typeface="+mn-ea"/>
-              </a:rPr>
-              <a:t>Создание и установка SDP</a:t>
-            </a:r>
-            <a:endParaRPr lang="ru-RU" altLang="en-US"/>
-          </a:p>
-        </p:txBody>
-      </p:sp>
-      <p:pic>
-        <p:nvPicPr>
-          <p:cNvPr id="12" name="Изображение 15"/>
-          <p:cNvPicPr>
-            <a:picLocks noChangeAspect="1"/>
-          </p:cNvPicPr>
-          <p:nvPr/>
-        </p:nvPicPr>
-        <p:blipFill>
-          <a:blip r:embed="rId2"/>
-          <a:stretch>
-            <a:fillRect/>
-          </a:stretch>
-        </p:blipFill>
-        <p:spPr>
-          <a:xfrm>
-            <a:off x="838200" y="1564005"/>
-            <a:ext cx="5503545" cy="3679190"/>
-          </a:xfrm>
-          <a:prstGeom prst="rect">
-            <a:avLst/>
-          </a:prstGeom>
-          <a:noFill/>
-          <a:ln>
-            <a:noFill/>
-          </a:ln>
-        </p:spPr>
-      </p:pic>
-      <p:sp>
-        <p:nvSpPr>
-          <p:cNvPr id="13" name="Текстовое поле 12"/>
-          <p:cNvSpPr txBox="1"/>
-          <p:nvPr/>
-        </p:nvSpPr>
-        <p:spPr>
-          <a:xfrm>
-            <a:off x="2009140" y="5243195"/>
-            <a:ext cx="2961005" cy="368300"/>
-          </a:xfrm>
-          <a:prstGeom prst="rect">
-            <a:avLst/>
-          </a:prstGeom>
-          <a:noFill/>
-        </p:spPr>
-        <p:txBody>
-          <a:bodyPr wrap="square" rtlCol="0" anchor="t">
-            <a:spAutoFit/>
-          </a:bodyPr>
-          <a:p>
-            <a:r>
-              <a:rPr lang="en-US" altLang="en-US">
-                <a:sym typeface="+mn-ea"/>
-              </a:rPr>
-              <a:t>Создание p2p соединения</a:t>
-            </a:r>
-            <a:endParaRPr lang="ru-RU" altLang="en-US"/>
-          </a:p>
-        </p:txBody>
-      </p:sp>
-    </p:spTree>
-  </p:cSld>
-  <p:clrMapOvr>
-    <a:masterClrMapping/>
-  </p:clrMapOvr>
-</p:sld>
-</file>
-
-<file path=ppt/slides/slide16.xml><?xml version="1.0" encoding="utf-8"?>
-<p:sld xmlns:a="http://schemas.openxmlformats.org/drawingml/2006/main" xmlns:r="http://schemas.openxmlformats.org/officeDocument/2006/relationships" xmlns:p="http://schemas.openxmlformats.org/presentationml/2006/main">
-  <p:cSld>
-    <p:spTree>
-      <p:nvGrpSpPr>
-        <p:cNvPr id="1" name=""/>
-        <p:cNvGrpSpPr/>
-        <p:nvPr/>
-      </p:nvGrpSpPr>
-      <p:grpSpPr/>
-      <p:sp>
-        <p:nvSpPr>
-          <p:cNvPr id="2" name="Заголовок 1"/>
-          <p:cNvSpPr>
-            <a:spLocks noGrp="1"/>
-          </p:cNvSpPr>
-          <p:nvPr>
-            <p:ph type="title"/>
-          </p:nvPr>
-        </p:nvSpPr>
-        <p:spPr/>
-        <p:txBody>
-          <a:bodyPr>
-            <a:normAutofit/>
-          </a:bodyPr>
-          <a:p>
-            <a:r>
-              <a:rPr lang="en-US" altLang="en-US">
-                <a:sym typeface="+mn-ea"/>
-              </a:rPr>
-              <a:t>Реализованные функции программы</a:t>
-            </a:r>
-            <a:endParaRPr lang="" altLang="en-US"/>
-          </a:p>
-        </p:txBody>
-      </p:sp>
-      <p:pic>
-        <p:nvPicPr>
-          <p:cNvPr id="7" name="Изображение 18"/>
-          <p:cNvPicPr>
-            <a:picLocks noChangeAspect="1"/>
-          </p:cNvPicPr>
-          <p:nvPr/>
-        </p:nvPicPr>
-        <p:blipFill>
-          <a:blip r:embed="rId1"/>
-          <a:stretch>
-            <a:fillRect/>
-          </a:stretch>
-        </p:blipFill>
-        <p:spPr>
-          <a:xfrm>
-            <a:off x="582295" y="1691005"/>
-            <a:ext cx="4846955" cy="1179195"/>
-          </a:xfrm>
-          <a:prstGeom prst="rect">
-            <a:avLst/>
-          </a:prstGeom>
-          <a:noFill/>
-          <a:ln>
-            <a:noFill/>
-          </a:ln>
-        </p:spPr>
-      </p:pic>
-      <p:sp>
-        <p:nvSpPr>
-          <p:cNvPr id="8" name="Текстовое поле 7"/>
-          <p:cNvSpPr txBox="1"/>
-          <p:nvPr/>
-        </p:nvSpPr>
-        <p:spPr>
-          <a:xfrm>
-            <a:off x="848360" y="3034665"/>
-            <a:ext cx="4064000" cy="368300"/>
-          </a:xfrm>
-          <a:prstGeom prst="rect">
-            <a:avLst/>
-          </a:prstGeom>
-          <a:noFill/>
-        </p:spPr>
-        <p:txBody>
-          <a:bodyPr wrap="none" rtlCol="0" anchor="t">
-            <a:spAutoFit/>
-          </a:bodyPr>
-          <a:p>
-            <a:r>
-              <a:rPr lang="en-US" altLang="en-US">
-                <a:sym typeface="+mn-ea"/>
-              </a:rPr>
-              <a:t>Создание </a:t>
-            </a:r>
-            <a:r>
-              <a:rPr lang="" altLang="en-US">
-                <a:sym typeface="+mn-ea"/>
-              </a:rPr>
-              <a:t>потока</a:t>
-            </a:r>
-            <a:r>
-              <a:rPr lang="en-US" altLang="en-US">
-                <a:sym typeface="+mn-ea"/>
-              </a:rPr>
-              <a:t> и подписка на </a:t>
-            </a:r>
-            <a:r>
-              <a:rPr lang="" altLang="en-US">
-                <a:sym typeface="+mn-ea"/>
-              </a:rPr>
-              <a:t>него</a:t>
-            </a:r>
-            <a:endParaRPr lang="" altLang="en-US">
-              <a:sym typeface="+mn-ea"/>
-            </a:endParaRPr>
-          </a:p>
-        </p:txBody>
-      </p:sp>
-      <p:pic>
-        <p:nvPicPr>
-          <p:cNvPr id="43" name="Изображение 13"/>
-          <p:cNvPicPr>
-            <a:picLocks noChangeAspect="1"/>
-          </p:cNvPicPr>
-          <p:nvPr/>
-        </p:nvPicPr>
-        <p:blipFill>
-          <a:blip r:embed="rId2"/>
-          <a:stretch>
-            <a:fillRect/>
-          </a:stretch>
-        </p:blipFill>
-        <p:spPr>
-          <a:xfrm>
-            <a:off x="838200" y="4521200"/>
-            <a:ext cx="8696325" cy="1561465"/>
-          </a:xfrm>
-          <a:prstGeom prst="rect">
-            <a:avLst/>
-          </a:prstGeom>
-          <a:noFill/>
-          <a:ln>
-            <a:noFill/>
-          </a:ln>
-        </p:spPr>
-      </p:pic>
-      <p:sp>
-        <p:nvSpPr>
-          <p:cNvPr id="11" name="Текстовое поле 10"/>
-          <p:cNvSpPr txBox="1"/>
-          <p:nvPr/>
-        </p:nvSpPr>
-        <p:spPr>
-          <a:xfrm>
-            <a:off x="838200" y="6082665"/>
-            <a:ext cx="6441440" cy="368300"/>
-          </a:xfrm>
-          <a:prstGeom prst="rect">
-            <a:avLst/>
-          </a:prstGeom>
-          <a:noFill/>
-        </p:spPr>
-        <p:txBody>
-          <a:bodyPr wrap="none" rtlCol="0" anchor="t">
-            <a:spAutoFit/>
-          </a:bodyPr>
-          <a:p>
-            <a:r>
-              <a:rPr lang="" altLang="en-US">
-                <a:sym typeface="+mn-ea"/>
-              </a:rPr>
-              <a:t>Получение информации о медиаустройствах пользователя</a:t>
-            </a:r>
-            <a:endParaRPr lang="" altLang="en-US">
-              <a:sym typeface="+mn-ea"/>
-            </a:endParaRPr>
-          </a:p>
-        </p:txBody>
-      </p:sp>
-    </p:spTree>
-  </p:cSld>
-  <p:clrMapOvr>
-    <a:masterClrMapping/>
-  </p:clrMapOvr>
-</p:sld>
-</file>
-
-<file path=ppt/slides/slide17.xml><?xml version="1.0" encoding="utf-8"?>
-<p:sld xmlns:a="http://schemas.openxmlformats.org/drawingml/2006/main" xmlns:r="http://schemas.openxmlformats.org/officeDocument/2006/relationships" xmlns:p="http://schemas.openxmlformats.org/presentationml/2006/main">
-  <p:cSld>
-    <p:spTree>
-      <p:nvGrpSpPr>
-        <p:cNvPr id="1" name=""/>
-        <p:cNvGrpSpPr/>
-        <p:nvPr/>
-      </p:nvGrpSpPr>
-      <p:grpSpPr/>
-      <p:sp>
-        <p:nvSpPr>
-          <p:cNvPr id="2" name="Заголовок 1"/>
-          <p:cNvSpPr>
-            <a:spLocks noGrp="1"/>
-          </p:cNvSpPr>
-          <p:nvPr>
-            <p:ph type="title"/>
-          </p:nvPr>
-        </p:nvSpPr>
-        <p:spPr/>
-        <p:txBody>
-          <a:bodyPr/>
-          <a:p>
-            <a:r>
-              <a:rPr lang="en-US" altLang="en-US"/>
-              <a:t>Безопасность	</a:t>
-            </a:r>
-            <a:endParaRPr lang="en-US" altLang="en-US"/>
-          </a:p>
-        </p:txBody>
-      </p:sp>
-      <p:sp>
-        <p:nvSpPr>
-          <p:cNvPr id="3" name="Замещающее содержимое 2"/>
-          <p:cNvSpPr/>
-          <p:nvPr>
-            <p:ph idx="1"/>
-          </p:nvPr>
-        </p:nvSpPr>
-        <p:spPr/>
-        <p:txBody>
-          <a:bodyPr/>
-          <a:p>
-            <a:pPr>
-              <a:lnSpc>
-                <a:spcPct val="150000"/>
-              </a:lnSpc>
-            </a:pPr>
-            <a:r>
-              <a:rPr lang="en-US" altLang="ru-RU">
-                <a:solidFill>
-                  <a:schemeClr val="tx1"/>
-                </a:solidFill>
-              </a:rPr>
-              <a:t>Работает только по HTTPS</a:t>
-            </a:r>
-            <a:endParaRPr lang="en-US" altLang="ru-RU">
-              <a:solidFill>
-                <a:schemeClr val="tx1"/>
-              </a:solidFill>
-            </a:endParaRPr>
-          </a:p>
-          <a:p>
-            <a:pPr>
-              <a:lnSpc>
-                <a:spcPct val="150000"/>
-              </a:lnSpc>
-            </a:pPr>
-            <a:r>
-              <a:rPr lang="en-US" altLang="ru-RU">
-                <a:solidFill>
-                  <a:schemeClr val="tx1"/>
-                </a:solidFill>
-              </a:rPr>
-              <a:t>Медиа потоки шифруются (DTLS и SRTP)</a:t>
-            </a:r>
-            <a:endParaRPr lang="en-US" altLang="ru-RU">
-              <a:solidFill>
-                <a:schemeClr val="tx1"/>
-              </a:solidFill>
-            </a:endParaRPr>
-          </a:p>
-          <a:p>
-            <a:pPr>
-              <a:lnSpc>
-                <a:spcPct val="150000"/>
-              </a:lnSpc>
-            </a:pPr>
-            <a:r>
-              <a:rPr lang="en-US" altLang="ru-RU">
-                <a:solidFill>
-                  <a:schemeClr val="tx1"/>
-                </a:solidFill>
-              </a:rPr>
-              <a:t>Технология не требует установки плагинов</a:t>
-            </a:r>
-            <a:endParaRPr lang="en-US" altLang="ru-RU">
-              <a:solidFill>
-                <a:schemeClr val="tx1"/>
-              </a:solidFill>
-            </a:endParaRPr>
-          </a:p>
-          <a:p>
-            <a:pPr>
-              <a:lnSpc>
-                <a:spcPct val="150000"/>
-              </a:lnSpc>
-            </a:pPr>
-            <a:r>
-              <a:rPr lang="en-US" altLang="ru-RU">
-                <a:solidFill>
-                  <a:schemeClr val="tx1"/>
-                </a:solidFill>
-              </a:rPr>
-              <a:t>Не получится сделать шпионское приложение</a:t>
-            </a:r>
-            <a:endParaRPr lang="en-US" altLang="ru-RU">
-              <a:solidFill>
-                <a:schemeClr val="tx1"/>
-              </a:solidFill>
-            </a:endParaRPr>
-          </a:p>
-        </p:txBody>
-      </p:sp>
-    </p:spTree>
-  </p:cSld>
-  <p:clrMapOvr>
-    <a:masterClrMapping/>
-  </p:clrMapOvr>
-</p:sld>
-</file>
-
-<file path=ppt/slides/slide18.xml><?xml version="1.0" encoding="utf-8"?>
-<p:sld xmlns:a="http://schemas.openxmlformats.org/drawingml/2006/main" xmlns:r="http://schemas.openxmlformats.org/officeDocument/2006/relationships" xmlns:p="http://schemas.openxmlformats.org/presentationml/2006/main">
-  <p:cSld>
-    <p:spTree>
-      <p:nvGrpSpPr>
-        <p:cNvPr id="1" name=""/>
-        <p:cNvGrpSpPr/>
-        <p:nvPr/>
-      </p:nvGrpSpPr>
-      <p:grpSpPr/>
-      <p:sp>
-        <p:nvSpPr>
-          <p:cNvPr id="2" name="Заголовок 1"/>
-          <p:cNvSpPr>
-            <a:spLocks noGrp="1"/>
-          </p:cNvSpPr>
-          <p:nvPr>
-            <p:ph type="title"/>
-          </p:nvPr>
-        </p:nvSpPr>
-        <p:spPr/>
-        <p:txBody>
-          <a:bodyPr/>
-          <a:p>
-            <a:r>
-              <a:rPr lang="en-US" altLang="en-US"/>
-              <a:t>Требования при работе с ПО</a:t>
-            </a:r>
-            <a:endParaRPr lang="en-US" altLang="en-US"/>
-          </a:p>
-        </p:txBody>
-      </p:sp>
-      <p:sp>
-        <p:nvSpPr>
-          <p:cNvPr id="7" name="Замещающее содержимое 6"/>
-          <p:cNvSpPr/>
-          <p:nvPr>
-            <p:ph idx="1"/>
-          </p:nvPr>
-        </p:nvSpPr>
-        <p:spPr/>
-        <p:txBody>
-          <a:bodyPr/>
-          <a:p>
-            <a:pPr marL="0" indent="0">
-              <a:lnSpc>
-                <a:spcPct val="150000"/>
-              </a:lnSpc>
-              <a:buNone/>
-            </a:pPr>
-            <a:r>
-              <a:rPr lang="en-US" altLang="en-US"/>
-              <a:t>Для пользования продуктом необходимо лишь установить браузер и иметь сетевое соединение.</a:t>
-            </a:r>
-            <a:endParaRPr lang="en-US" altLang="en-US"/>
-          </a:p>
-          <a:p>
-            <a:pPr marL="0" indent="0">
-              <a:lnSpc>
-                <a:spcPct val="150000"/>
-              </a:lnSpc>
-              <a:buNone/>
-            </a:pPr>
-            <a:endParaRPr lang="en-US" altLang="en-US"/>
-          </a:p>
-          <a:p>
-            <a:pPr marL="0" indent="0">
-              <a:lnSpc>
-                <a:spcPct val="150000"/>
-              </a:lnSpc>
-              <a:buNone/>
-            </a:pPr>
-            <a:r>
-              <a:rPr lang="en-US" altLang="en-US"/>
-              <a:t>Поддержка в браузерах:</a:t>
-            </a:r>
-            <a:endParaRPr lang="en-US" altLang="en-US"/>
-          </a:p>
-          <a:p>
-            <a:pPr marL="0" indent="0">
-              <a:lnSpc>
-                <a:spcPct val="150000"/>
-              </a:lnSpc>
-              <a:buNone/>
-            </a:pPr>
-            <a:endParaRPr lang="en-US" altLang="en-US"/>
-          </a:p>
-        </p:txBody>
-      </p:sp>
-      <p:graphicFrame>
-        <p:nvGraphicFramePr>
-          <p:cNvPr id="4" name="Таблица 3"/>
-          <p:cNvGraphicFramePr/>
-          <p:nvPr/>
-        </p:nvGraphicFramePr>
-        <p:xfrm>
-          <a:off x="838200" y="5194300"/>
-          <a:ext cx="10515600" cy="1243330"/>
-        </p:xfrm>
-        <a:graphic>
-          <a:graphicData uri="http://schemas.openxmlformats.org/drawingml/2006/table">
-            <a:tbl>
-              <a:tblPr firstRow="1" bandRow="1">
-                <a:effectLst>
-                  <a:outerShdw blurRad="114300" dist="25400" dir="5340000" algn="tl" rotWithShape="0">
-                    <a:prstClr val="black">
-                      <a:alpha val="29000"/>
-                    </a:prstClr>
-                  </a:outerShdw>
-                </a:effectLst>
-                <a:tableStyleId>{5C22544A-7EE6-4342-B048-85BDC9FD1C3A}</a:tableStyleId>
-              </a:tblPr>
-              <a:tblGrid>
-                <a:gridCol w="2628900"/>
-                <a:gridCol w="2628900"/>
-                <a:gridCol w="2628900"/>
-                <a:gridCol w="2628900"/>
-              </a:tblGrid>
-              <a:tr h="621665">
-                <a:tc>
-                  <a:txBody>
-                    <a:bodyPr/>
-                    <a:p>
-                      <a:pPr>
-                        <a:buNone/>
-                      </a:pPr>
-                      <a:r>
-                        <a:rPr lang="en-US" altLang="ru-RU" sz="2500">
-                          <a:solidFill>
-                            <a:schemeClr val="tx1"/>
-                          </a:solidFill>
-                        </a:rPr>
-                        <a:t>Chrome</a:t>
-                      </a:r>
-                      <a:endParaRPr lang="en-US" altLang="ru-RU" sz="2500">
-                        <a:solidFill>
-                          <a:schemeClr val="tx1"/>
-                        </a:solidFill>
-                      </a:endParaRPr>
-                    </a:p>
-                  </a:txBody>
-                  <a:tcPr>
-                    <a:noFill/>
-                  </a:tcPr>
-                </a:tc>
-                <a:tc>
-                  <a:txBody>
-                    <a:bodyPr/>
-                    <a:p>
-                      <a:pPr>
-                        <a:buNone/>
-                      </a:pPr>
-                      <a:r>
-                        <a:rPr lang="en-US" altLang="ru-RU" sz="2500">
-                          <a:solidFill>
-                            <a:schemeClr val="tx1"/>
-                          </a:solidFill>
-                        </a:rPr>
-                        <a:t>Safari</a:t>
-                      </a:r>
-                      <a:endParaRPr lang="en-US" altLang="ru-RU" sz="2500">
-                        <a:solidFill>
-                          <a:schemeClr val="tx1"/>
-                        </a:solidFill>
-                      </a:endParaRPr>
-                    </a:p>
-                  </a:txBody>
-                  <a:tcPr>
-                    <a:noFill/>
-                  </a:tcPr>
-                </a:tc>
-                <a:tc>
-                  <a:txBody>
-                    <a:bodyPr/>
-                    <a:p>
-                      <a:pPr>
-                        <a:buNone/>
-                      </a:pPr>
-                      <a:r>
-                        <a:rPr lang="en-US" altLang="ru-RU" sz="2500">
-                          <a:solidFill>
-                            <a:schemeClr val="tx1"/>
-                          </a:solidFill>
-                        </a:rPr>
-                        <a:t>Firefox</a:t>
-                      </a:r>
-                      <a:endParaRPr lang="en-US" altLang="ru-RU" sz="2500">
-                        <a:solidFill>
-                          <a:schemeClr val="tx1"/>
-                        </a:solidFill>
-                      </a:endParaRPr>
-                    </a:p>
-                  </a:txBody>
-                  <a:tcPr>
-                    <a:noFill/>
-                  </a:tcPr>
-                </a:tc>
-                <a:tc>
-                  <a:txBody>
-                    <a:bodyPr/>
-                    <a:p>
-                      <a:pPr>
-                        <a:buNone/>
-                      </a:pPr>
-                      <a:r>
-                        <a:rPr lang="en-US" altLang="ru-RU" sz="2500">
-                          <a:solidFill>
-                            <a:schemeClr val="tx1"/>
-                          </a:solidFill>
-                        </a:rPr>
-                        <a:t>Opera</a:t>
-                      </a:r>
-                      <a:endParaRPr lang="en-US" altLang="ru-RU" sz="2500">
-                        <a:solidFill>
-                          <a:schemeClr val="tx1"/>
-                        </a:solidFill>
-                      </a:endParaRPr>
-                    </a:p>
-                  </a:txBody>
-                  <a:tcPr>
-                    <a:noFill/>
-                  </a:tcPr>
-                </a:tc>
-              </a:tr>
-              <a:tr h="621665">
-                <a:tc>
-                  <a:txBody>
-                    <a:bodyPr/>
-                    <a:p>
-                      <a:pPr>
-                        <a:buNone/>
-                      </a:pPr>
-                      <a:r>
-                        <a:rPr lang="en-US" altLang="ru-RU" sz="2500">
-                          <a:solidFill>
-                            <a:schemeClr val="tx1"/>
-                          </a:solidFill>
-                        </a:rPr>
-                        <a:t>23+</a:t>
-                      </a:r>
-                      <a:endParaRPr lang="en-US" altLang="ru-RU" sz="2500">
-                        <a:solidFill>
-                          <a:schemeClr val="tx1"/>
-                        </a:solidFill>
-                      </a:endParaRPr>
-                    </a:p>
-                  </a:txBody>
-                  <a:tcPr>
-                    <a:noFill/>
-                  </a:tcPr>
-                </a:tc>
-                <a:tc>
-                  <a:txBody>
-                    <a:bodyPr/>
-                    <a:p>
-                      <a:pPr>
-                        <a:buNone/>
-                      </a:pPr>
-                      <a:r>
-                        <a:rPr lang="en-US" altLang="ru-RU" sz="2500">
-                          <a:solidFill>
-                            <a:schemeClr val="tx1"/>
-                          </a:solidFill>
-                        </a:rPr>
-                        <a:t>11+</a:t>
-                      </a:r>
-                      <a:endParaRPr lang="en-US" altLang="ru-RU" sz="2500">
-                        <a:solidFill>
-                          <a:schemeClr val="tx1"/>
-                        </a:solidFill>
-                      </a:endParaRPr>
-                    </a:p>
-                  </a:txBody>
-                  <a:tcPr>
-                    <a:noFill/>
-                  </a:tcPr>
-                </a:tc>
-                <a:tc>
-                  <a:txBody>
-                    <a:bodyPr/>
-                    <a:p>
-                      <a:pPr>
-                        <a:buNone/>
-                      </a:pPr>
-                      <a:r>
-                        <a:rPr lang="en-US" altLang="ru-RU" sz="2500">
-                          <a:solidFill>
-                            <a:schemeClr val="tx1"/>
-                          </a:solidFill>
-                        </a:rPr>
-                        <a:t>38+</a:t>
-                      </a:r>
-                      <a:endParaRPr lang="en-US" altLang="ru-RU" sz="2500">
-                        <a:solidFill>
-                          <a:schemeClr val="tx1"/>
-                        </a:solidFill>
-                      </a:endParaRPr>
-                    </a:p>
-                  </a:txBody>
-                  <a:tcPr>
-                    <a:noFill/>
-                  </a:tcPr>
-                </a:tc>
-                <a:tc>
-                  <a:txBody>
-                    <a:bodyPr/>
-                    <a:p>
-                      <a:pPr>
-                        <a:buNone/>
-                      </a:pPr>
-                      <a:r>
-                        <a:rPr lang="en-US" altLang="ru-RU" sz="2500">
-                          <a:solidFill>
-                            <a:schemeClr val="tx1"/>
-                          </a:solidFill>
-                        </a:rPr>
-                        <a:t>12+</a:t>
-                      </a:r>
-                      <a:endParaRPr lang="en-US" altLang="ru-RU" sz="2500">
-                        <a:solidFill>
-                          <a:schemeClr val="tx1"/>
-                        </a:solidFill>
-                      </a:endParaRPr>
-                    </a:p>
-                  </a:txBody>
-                  <a:tcPr>
-                    <a:noFill/>
-                  </a:tcPr>
-                </a:tc>
-              </a:tr>
-            </a:tbl>
-          </a:graphicData>
-        </a:graphic>
-      </p:graphicFrame>
-    </p:spTree>
-  </p:cSld>
-  <p:clrMapOvr>
-    <a:masterClrMapping/>
-  </p:clrMapOvr>
-</p:sld>
-</file>
-
-<file path=ppt/slides/slide19.xml><?xml version="1.0" encoding="utf-8"?>
-<p:sld xmlns:a="http://schemas.openxmlformats.org/drawingml/2006/main" xmlns:r="http://schemas.openxmlformats.org/officeDocument/2006/relationships" xmlns:p="http://schemas.openxmlformats.org/presentationml/2006/main">
-  <p:cSld>
-    <p:spTree>
-      <p:nvGrpSpPr>
-        <p:cNvPr id="1" name=""/>
-        <p:cNvGrpSpPr/>
-        <p:nvPr/>
-      </p:nvGrpSpPr>
-      <p:grpSpPr/>
-      <p:sp>
-        <p:nvSpPr>
-          <p:cNvPr id="2" name="Заголовок 1"/>
-          <p:cNvSpPr>
-            <a:spLocks noGrp="1"/>
-          </p:cNvSpPr>
-          <p:nvPr>
-            <p:ph type="title"/>
-          </p:nvPr>
-        </p:nvSpPr>
-        <p:spPr/>
-        <p:txBody>
-          <a:bodyPr>
-            <a:normAutofit fontScale="90000"/>
-          </a:bodyPr>
-          <a:p>
-            <a:r>
-              <a:rPr lang="en-US" altLang="en-US"/>
+              <a:rPr lang="en-US" altLang="en-US" sz="3600"/>
               <a:t>Сравнение приложения с популярными сервисами</a:t>
             </a:r>
-            <a:endParaRPr lang="en-US" altLang="en-US"/>
+            <a:endParaRPr lang="en-US" altLang="en-US" sz="3600"/>
           </a:p>
         </p:txBody>
       </p:sp>
@@ -6006,7 +4394,7 @@
                         <a:t>0.</a:t>
                       </a:r>
                       <a:r>
-                        <a:rPr lang="" altLang="en-US" sz="1600" b="0">
+                        <a:rPr lang="en-US" altLang="en-US" sz="1600" b="0">
                           <a:latin typeface="Times New Roman" panose="02020603050405020304" charset="0"/>
                           <a:cs typeface="Times New Roman" panose="02020603050405020304" charset="0"/>
                         </a:rPr>
@@ -6729,7 +5117,7 @@
 </p:sld>
 </file>
 
-<file path=ppt/slides/slide2.xml><?xml version="1.0" encoding="utf-8"?>
+<file path=ppt/slides/slide11.xml><?xml version="1.0" encoding="utf-8"?>
 <p:sld xmlns:a="http://schemas.openxmlformats.org/drawingml/2006/main" xmlns:r="http://schemas.openxmlformats.org/officeDocument/2006/relationships" xmlns:p="http://schemas.openxmlformats.org/presentationml/2006/main">
   <p:cSld>
     <p:spTree>
@@ -6751,121 +5139,13 @@
         </p:nvSpPr>
         <p:spPr/>
         <p:txBody>
-          <a:bodyPr/>
-          <a:p>
-            <a:r>
-              <a:rPr lang="en-US" altLang="ru-RU"/>
-              <a:t>Цель </a:t>
-            </a:r>
-            <a:r>
-              <a:rPr lang="" altLang="en-US"/>
-              <a:t>работы</a:t>
-            </a:r>
-            <a:endParaRPr lang="" altLang="en-US"/>
-          </a:p>
-        </p:txBody>
-      </p:sp>
-      <p:sp>
-        <p:nvSpPr>
-          <p:cNvPr id="3" name="Замещающее содержимое 2"/>
-          <p:cNvSpPr>
-            <a:spLocks noGrp="1"/>
-          </p:cNvSpPr>
-          <p:nvPr>
-            <p:ph idx="1"/>
-          </p:nvPr>
-        </p:nvSpPr>
-        <p:spPr/>
-        <p:txBody>
-          <a:bodyPr>
-            <a:normAutofit/>
-          </a:bodyPr>
-          <a:p>
-            <a:pPr marL="0" indent="0">
-              <a:lnSpc>
-                <a:spcPct val="150000"/>
-              </a:lnSpc>
-              <a:buNone/>
-            </a:pPr>
-            <a:r>
-              <a:rPr lang="" altLang="en-US" sz="2500"/>
-              <a:t>С</a:t>
-            </a:r>
-            <a:r>
-              <a:rPr lang="en-US" altLang="ru-RU" sz="2500"/>
-              <a:t>оздание </a:t>
-            </a:r>
-            <a:r>
-              <a:rPr lang="" altLang="en-US" sz="2500"/>
-              <a:t>видео чата </a:t>
-            </a:r>
-            <a:r>
-              <a:rPr lang="en-US" altLang="ru-RU" sz="2500"/>
-              <a:t>на основ</a:t>
-            </a:r>
-            <a:r>
-              <a:rPr lang="" altLang="en-US" sz="2500"/>
-              <a:t>е</a:t>
-            </a:r>
-            <a:r>
-              <a:rPr lang="en-US" altLang="ru-RU" sz="2500"/>
-              <a:t> </a:t>
-            </a:r>
-            <a:r>
-              <a:rPr lang="en-US" altLang="ru-RU" sz="2500">
-                <a:sym typeface="+mn-ea"/>
-              </a:rPr>
-              <a:t>webRTC стандарта </a:t>
-            </a:r>
-            <a:r>
-              <a:rPr lang="en-US" altLang="ru-RU" sz="2500"/>
-              <a:t>для установления соединения  и обмена информацией между конечными пользователями.</a:t>
-            </a:r>
-            <a:endParaRPr lang="en-US" altLang="ru-RU" sz="2500"/>
-          </a:p>
-        </p:txBody>
-      </p:sp>
-    </p:spTree>
-  </p:cSld>
-  <p:clrMapOvr>
-    <a:masterClrMapping/>
-  </p:clrMapOvr>
-</p:sld>
-</file>
-
-<file path=ppt/slides/slide20.xml><?xml version="1.0" encoding="utf-8"?>
-<p:sld xmlns:a="http://schemas.openxmlformats.org/drawingml/2006/main" xmlns:r="http://schemas.openxmlformats.org/officeDocument/2006/relationships" xmlns:p="http://schemas.openxmlformats.org/presentationml/2006/main">
-  <p:cSld>
-    <p:spTree>
-      <p:nvGrpSpPr>
-        <p:cNvPr id="1" name=""/>
-        <p:cNvGrpSpPr/>
-        <p:nvPr/>
-      </p:nvGrpSpPr>
-      <p:grpSpPr/>
-      <p:sp>
-        <p:nvSpPr>
-          <p:cNvPr id="2" name="Заголовок 1"/>
-          <p:cNvSpPr>
-            <a:spLocks noGrp="1"/>
-          </p:cNvSpPr>
-          <p:nvPr>
-            <p:ph type="title"/>
-          </p:nvPr>
-        </p:nvSpPr>
-        <p:spPr/>
-        <p:txBody>
           <a:bodyPr>
             <a:normAutofit fontScale="90000"/>
           </a:bodyPr>
           <a:p>
             <a:r>
-              <a:rPr lang="" altLang="en-US"/>
-              <a:t>В</a:t>
-            </a:r>
-            <a:r>
               <a:rPr lang="en-US" altLang="en-US"/>
-              <a:t>лияние количества участников системы на ресурсы системы</a:t>
+              <a:t>Влияние количества участников системы на ресурсы системы</a:t>
             </a:r>
             <a:endParaRPr lang="en-US" altLang="en-US"/>
           </a:p>
@@ -6909,7 +5189,7 @@
 </p:sld>
 </file>
 
-<file path=ppt/slides/slide21.xml><?xml version="1.0" encoding="utf-8"?>
+<file path=ppt/slides/slide12.xml><?xml version="1.0" encoding="utf-8"?>
 <p:sld xmlns:a="http://schemas.openxmlformats.org/drawingml/2006/main" xmlns:r="http://schemas.openxmlformats.org/officeDocument/2006/relationships" xmlns:p="http://schemas.openxmlformats.org/presentationml/2006/main">
   <p:cSld>
     <p:spTree>
@@ -6936,10 +5216,10 @@
           </a:bodyPr>
           <a:p>
             <a:r>
-              <a:rPr lang="en-US" altLang="en-US"/>
+              <a:rPr lang="en-US" altLang="en-US" sz="3600"/>
               <a:t>Заключение	</a:t>
             </a:r>
-            <a:endParaRPr lang="en-US" altLang="en-US"/>
+            <a:endParaRPr lang="en-US" altLang="en-US" sz="3600"/>
           </a:p>
         </p:txBody>
       </p:sp>
@@ -6953,13 +5233,13 @@
         </p:nvSpPr>
         <p:spPr>
           <a:xfrm>
-            <a:off x="838200" y="1825625"/>
-            <a:ext cx="11073765" cy="4351655"/>
+            <a:off x="524510" y="1825625"/>
+            <a:ext cx="11654155" cy="4969510"/>
           </a:xfrm>
         </p:spPr>
         <p:txBody>
           <a:bodyPr>
-            <a:normAutofit fontScale="90000"/>
+            <a:normAutofit fontScale="70000"/>
           </a:bodyPr>
           <a:p>
             <a:pPr marL="0" indent="0">
@@ -6969,16 +5249,8 @@
               <a:buNone/>
             </a:pPr>
             <a:r>
-              <a:rPr lang="ru-RU" altLang="en-US"/>
-              <a:t>Разработанный </a:t>
-            </a:r>
-            <a:r>
-              <a:rPr lang="en-US" altLang="ru-RU"/>
-              <a:t>продукт </a:t>
-            </a:r>
-            <a:r>
-              <a:rPr lang="ru-RU" altLang="en-US"/>
-              <a:t>может  применяться  для  проведения  онлайн-конференций в учебных целях. Для организации трансляции требуется только создать комнату и поделиться ссылкой с участниками. </a:t>
+              <a:rPr lang="" altLang="ru-RU"/>
+              <a:t>В данной работе решены прежде поставленные задачи:</a:t>
             </a:r>
             <a:endParaRPr lang="ru-RU" altLang="en-US"/>
           </a:p>
@@ -6989,19 +5261,106 @@
               </a:lnSpc>
               <a:buNone/>
             </a:pPr>
+            <a:endParaRPr lang="ru-RU" altLang="en-US"/>
+          </a:p>
+          <a:p>
+            <a:pPr marL="0" indent="0">
+              <a:lnSpc>
+                <a:spcPct val="150000"/>
+              </a:lnSpc>
+              <a:buNone/>
+            </a:pPr>
+            <a:r>
+              <a:rPr lang="ru-RU" altLang="en-US"/>
+              <a:t>Разработанный </a:t>
+            </a:r>
+            <a:r>
+              <a:rPr lang="en-US" altLang="ru-RU"/>
+              <a:t>продукт </a:t>
+            </a:r>
+            <a:r>
+              <a:rPr lang="ru-RU" altLang="en-US"/>
+              <a:t>может  применяться  для  проведения  </a:t>
+            </a:r>
+            <a:r>
+              <a:rPr lang="" altLang="ru-RU"/>
+              <a:t>защищенного видео чата</a:t>
+            </a:r>
+            <a:r>
+              <a:rPr lang="ru-RU" altLang="en-US"/>
+              <a:t>. </a:t>
+            </a:r>
+            <a:endParaRPr lang="ru-RU" altLang="en-US"/>
+          </a:p>
+          <a:p>
+            <a:pPr marL="0" indent="0">
+              <a:lnSpc>
+                <a:spcPct val="150000"/>
+              </a:lnSpc>
+              <a:buNone/>
+            </a:pPr>
+            <a:r>
+              <a:rPr lang="ru-RU" altLang="en-US"/>
+              <a:t>Для организации трансляции требуется только создать комнату и поделиться ссылкой с участниками. </a:t>
+            </a:r>
+            <a:endParaRPr lang="ru-RU" altLang="en-US"/>
+          </a:p>
+          <a:p>
+            <a:pPr marL="0" indent="0">
+              <a:lnSpc>
+                <a:spcPct val="150000"/>
+              </a:lnSpc>
+              <a:buNone/>
+            </a:pPr>
             <a:r>
               <a:rPr lang="en-US" altLang="ru-RU"/>
               <a:t>Нет необходимости </a:t>
             </a:r>
             <a:r>
               <a:rPr lang="ru-RU" altLang="en-US"/>
-              <a:t>устанавливать дополнительного ПО, сервис является кроссплатформенным, поддерживается большинством браузеров</a:t>
-            </a:r>
-            <a:r>
-              <a:rPr lang="en-US" altLang="ru-RU"/>
-              <a:t>.</a:t>
-            </a:r>
-            <a:endParaRPr lang="en-US" altLang="ru-RU"/>
+              <a:t>устанавливать дополнительного ПО,</a:t>
+            </a:r>
+            <a:endParaRPr lang="ru-RU" altLang="en-US"/>
+          </a:p>
+          <a:p>
+            <a:pPr marL="0" indent="0">
+              <a:lnSpc>
+                <a:spcPct val="150000"/>
+              </a:lnSpc>
+              <a:buNone/>
+            </a:pPr>
+            <a:r>
+              <a:rPr lang="" altLang="ru-RU"/>
+              <a:t>Программный продукт </a:t>
+            </a:r>
+            <a:r>
+              <a:rPr lang="ru-RU" altLang="en-US"/>
+              <a:t>является кроссплатформенным, </a:t>
+            </a:r>
+            <a:endParaRPr lang="ru-RU" altLang="en-US"/>
+          </a:p>
+          <a:p>
+            <a:pPr marL="0" indent="0">
+              <a:lnSpc>
+                <a:spcPct val="150000"/>
+              </a:lnSpc>
+              <a:buNone/>
+            </a:pPr>
+            <a:r>
+              <a:rPr lang="" altLang="ru-RU"/>
+              <a:t>Д</a:t>
+            </a:r>
+            <a:r>
+              <a:rPr lang="" altLang="ru-RU"/>
+              <a:t>анные передаются с помощью </a:t>
+            </a:r>
+            <a:r>
+              <a:rPr lang="" altLang="en-US">
+                <a:sym typeface="+mn-ea"/>
+              </a:rPr>
+              <a:t>протоколов беопасности.</a:t>
+            </a:r>
+            <a:endParaRPr lang="" altLang="en-US"/>
           </a:p>
         </p:txBody>
       </p:sp>
@@ -7013,7 +5372,7 @@
 </p:sld>
 </file>
 
-<file path=ppt/slides/slide22.xml><?xml version="1.0" encoding="utf-8"?>
+<file path=ppt/slides/slide13.xml><?xml version="1.0" encoding="utf-8"?>
 <p:sld xmlns:a="http://schemas.openxmlformats.org/drawingml/2006/main" xmlns:r="http://schemas.openxmlformats.org/officeDocument/2006/relationships" xmlns:p="http://schemas.openxmlformats.org/presentationml/2006/main">
   <p:cSld>
     <p:spTree>
@@ -7046,10 +5405,311 @@
           <a:p>
             <a:pPr algn="ctr"/>
             <a:r>
-              <a:rPr lang="" altLang="en-US"/>
+              <a:rPr lang="en-US" altLang="en-US"/>
               <a:t>Спасибо за внимание!</a:t>
             </a:r>
-            <a:endParaRPr lang="" altLang="en-US"/>
+            <a:endParaRPr lang="en-US" altLang="en-US"/>
+          </a:p>
+        </p:txBody>
+      </p:sp>
+    </p:spTree>
+  </p:cSld>
+  <p:clrMapOvr>
+    <a:masterClrMapping/>
+  </p:clrMapOvr>
+</p:sld>
+</file>
+
+<file path=ppt/slides/slide2.xml><?xml version="1.0" encoding="utf-8"?>
+<p:sld xmlns:a="http://schemas.openxmlformats.org/drawingml/2006/main" xmlns:r="http://schemas.openxmlformats.org/officeDocument/2006/relationships" xmlns:p="http://schemas.openxmlformats.org/presentationml/2006/main">
+  <p:cSld>
+    <p:spTree>
+      <p:nvGrpSpPr>
+        <p:cNvPr id="1" name=""/>
+        <p:cNvGrpSpPr/>
+        <p:nvPr/>
+      </p:nvGrpSpPr>
+      <p:grpSpPr/>
+      <p:sp>
+        <p:nvSpPr>
+          <p:cNvPr id="3" name="Замещающее содержимое 2"/>
+          <p:cNvSpPr>
+            <a:spLocks noGrp="1"/>
+          </p:cNvSpPr>
+          <p:nvPr>
+            <p:ph idx="1"/>
+          </p:nvPr>
+        </p:nvSpPr>
+        <p:spPr>
+          <a:xfrm>
+            <a:off x="558165" y="355600"/>
+            <a:ext cx="10795635" cy="6287770"/>
+          </a:xfrm>
+        </p:spPr>
+        <p:txBody>
+          <a:bodyPr>
+            <a:normAutofit fontScale="90000" lnSpcReduction="10000"/>
+          </a:bodyPr>
+          <a:p>
+            <a:pPr marL="0" indent="0">
+              <a:lnSpc>
+                <a:spcPct val="150000"/>
+              </a:lnSpc>
+              <a:buNone/>
+            </a:pPr>
+            <a:r>
+              <a:rPr lang="en-US" altLang="ru-RU" sz="2500" b="1">
+                <a:sym typeface="+mn-ea"/>
+              </a:rPr>
+              <a:t>Цель </a:t>
+            </a:r>
+            <a:r>
+              <a:rPr lang="en-US" altLang="en-US" sz="2500" b="1">
+                <a:sym typeface="+mn-ea"/>
+              </a:rPr>
+              <a:t>работы</a:t>
+            </a:r>
+            <a:r>
+              <a:rPr lang="en-US" altLang="en-US" sz="2500">
+                <a:sym typeface="+mn-ea"/>
+              </a:rPr>
+              <a:t> </a:t>
+            </a:r>
+            <a:r>
+              <a:rPr lang="" altLang="en-US" sz="2500">
+                <a:sym typeface="+mn-ea"/>
+              </a:rPr>
+              <a:t>- </a:t>
+            </a:r>
+            <a:r>
+              <a:rPr lang="" altLang="en-US" sz="2500"/>
+              <a:t>с</a:t>
+            </a:r>
+            <a:r>
+              <a:rPr lang="en-US" altLang="ru-RU" sz="2500"/>
+              <a:t>оздание </a:t>
+            </a:r>
+            <a:r>
+              <a:rPr lang="en-US" altLang="en-US" sz="2500"/>
+              <a:t>видео чата </a:t>
+            </a:r>
+            <a:r>
+              <a:rPr lang="en-US" altLang="ru-RU" sz="2500"/>
+              <a:t>на основ</a:t>
+            </a:r>
+            <a:r>
+              <a:rPr lang="en-US" altLang="en-US" sz="2500"/>
+              <a:t>е</a:t>
+            </a:r>
+            <a:r>
+              <a:rPr lang="en-US" altLang="ru-RU" sz="2500"/>
+              <a:t> </a:t>
+            </a:r>
+            <a:r>
+              <a:rPr lang="en-US" altLang="ru-RU" sz="2500">
+                <a:sym typeface="+mn-ea"/>
+              </a:rPr>
+              <a:t>webRTC стандарта </a:t>
+            </a:r>
+            <a:r>
+              <a:rPr lang="en-US" altLang="ru-RU" sz="2500"/>
+              <a:t>для установления соединения  и обмена информацией между конечными пользователями.</a:t>
+            </a:r>
+            <a:endParaRPr lang="en-US" altLang="ru-RU" sz="2500"/>
+          </a:p>
+          <a:p>
+            <a:pPr marL="0" indent="0">
+              <a:lnSpc>
+                <a:spcPct val="150000"/>
+              </a:lnSpc>
+              <a:buNone/>
+            </a:pPr>
+            <a:endParaRPr lang="en-US" altLang="ru-RU" sz="2500"/>
+          </a:p>
+          <a:p>
+            <a:pPr marL="0" indent="0">
+              <a:lnSpc>
+                <a:spcPct val="150000"/>
+              </a:lnSpc>
+              <a:buNone/>
+            </a:pPr>
+            <a:r>
+              <a:rPr lang="en-US" altLang="en-US" sz="2500" b="1">
+                <a:sym typeface="+mn-ea"/>
+              </a:rPr>
+              <a:t>Задачи</a:t>
+            </a:r>
+            <a:r>
+              <a:rPr lang="" altLang="en-US" sz="2500" b="1">
+                <a:sym typeface="+mn-ea"/>
+              </a:rPr>
+              <a:t>:</a:t>
+            </a:r>
+            <a:endParaRPr lang="en-US" altLang="en-US" sz="2500"/>
+          </a:p>
+          <a:p>
+            <a:pPr>
+              <a:lnSpc>
+                <a:spcPct val="150000"/>
+              </a:lnSpc>
+            </a:pPr>
+            <a:r>
+              <a:rPr lang="" altLang="en-US" sz="2500">
+                <a:sym typeface="+mn-ea"/>
+              </a:rPr>
+              <a:t>п</a:t>
+            </a:r>
+            <a:r>
+              <a:rPr lang="en-US" altLang="en-US" sz="2500">
+                <a:sym typeface="+mn-ea"/>
+              </a:rPr>
+              <a:t>роанали</a:t>
+            </a:r>
+            <a:r>
+              <a:rPr lang="" altLang="en-US" sz="2500">
+                <a:sym typeface="+mn-ea"/>
+              </a:rPr>
+              <a:t>з</a:t>
+            </a:r>
+            <a:r>
+              <a:rPr lang="en-US" altLang="en-US" sz="2500">
+                <a:sym typeface="+mn-ea"/>
+              </a:rPr>
+              <a:t>ировать разновидности технологий при создании видео чата</a:t>
+            </a:r>
+            <a:r>
+              <a:rPr lang="" altLang="en-US" sz="2500">
+                <a:sym typeface="+mn-ea"/>
+              </a:rPr>
+              <a:t>;</a:t>
+            </a:r>
+            <a:endParaRPr lang="en-US" sz="2500"/>
+          </a:p>
+          <a:p>
+            <a:pPr>
+              <a:lnSpc>
+                <a:spcPct val="150000"/>
+              </a:lnSpc>
+            </a:pPr>
+            <a:r>
+              <a:rPr lang="" altLang="en-US" sz="2500">
+                <a:sym typeface="+mn-ea"/>
+              </a:rPr>
+              <a:t>п</a:t>
+            </a:r>
+            <a:r>
+              <a:rPr lang="en-US" altLang="en-US" sz="2500">
+                <a:sym typeface="+mn-ea"/>
+              </a:rPr>
+              <a:t>роанали</a:t>
+            </a:r>
+            <a:r>
+              <a:rPr lang="" altLang="en-US" sz="2500">
+                <a:sym typeface="+mn-ea"/>
+              </a:rPr>
+              <a:t>з</a:t>
+            </a:r>
+            <a:r>
+              <a:rPr lang="en-US" altLang="en-US" sz="2500">
+                <a:sym typeface="+mn-ea"/>
+              </a:rPr>
+              <a:t>ировать </a:t>
+            </a:r>
+            <a:r>
+              <a:rPr lang="en-US" sz="2500">
+                <a:sym typeface="+mn-ea"/>
+              </a:rPr>
+              <a:t>теоретические сведения по стандарту webRTC;</a:t>
+            </a:r>
+            <a:endParaRPr lang="en-US" sz="2500"/>
+          </a:p>
+          <a:p>
+            <a:pPr>
+              <a:lnSpc>
+                <a:spcPct val="150000"/>
+              </a:lnSpc>
+            </a:pPr>
+            <a:r>
+              <a:rPr lang="" altLang="en-US" sz="2500">
+                <a:sym typeface="+mn-ea"/>
+              </a:rPr>
+              <a:t>р</a:t>
+            </a:r>
+            <a:r>
+              <a:rPr lang="en-US" sz="2500">
+                <a:sym typeface="+mn-ea"/>
+              </a:rPr>
+              <a:t>азработать программный продукт - видео чат - для организации передачи потоковых данных между браузерами </a:t>
+            </a:r>
+            <a:r>
+              <a:rPr lang="en-US" altLang="en-US" sz="2500">
+                <a:sym typeface="+mn-ea"/>
+              </a:rPr>
+              <a:t>на основе стандарта webRTC</a:t>
+            </a:r>
+            <a:r>
+              <a:rPr lang="en-US" sz="2500">
+                <a:sym typeface="+mn-ea"/>
+              </a:rPr>
+              <a:t>;</a:t>
+            </a:r>
+            <a:endParaRPr lang="en-US" sz="2500"/>
+          </a:p>
+          <a:p>
+            <a:pPr>
+              <a:lnSpc>
+                <a:spcPct val="150000"/>
+              </a:lnSpc>
+            </a:pPr>
+            <a:r>
+              <a:rPr lang="" altLang="en-US" sz="2500">
+                <a:sym typeface="+mn-ea"/>
+              </a:rPr>
+              <a:t>с</a:t>
+            </a:r>
+            <a:r>
+              <a:rPr lang="en-US" sz="2500">
+                <a:sym typeface="+mn-ea"/>
+              </a:rPr>
+              <a:t>равни</a:t>
+            </a:r>
+            <a:r>
+              <a:rPr lang="en-US" altLang="en-US" sz="2500">
+                <a:sym typeface="+mn-ea"/>
+              </a:rPr>
+              <a:t>ть</a:t>
+            </a:r>
+            <a:r>
+              <a:rPr lang="en-US" sz="2500">
+                <a:sym typeface="+mn-ea"/>
+              </a:rPr>
+              <a:t> разработанн</a:t>
+            </a:r>
+            <a:r>
+              <a:rPr lang="en-US" altLang="en-US" sz="2500">
+                <a:sym typeface="+mn-ea"/>
+              </a:rPr>
+              <a:t>ый</a:t>
+            </a:r>
+            <a:r>
+              <a:rPr lang="en-US" sz="2500">
+                <a:sym typeface="+mn-ea"/>
+              </a:rPr>
+              <a:t> </a:t>
+            </a:r>
+            <a:r>
+              <a:rPr lang="en-US" altLang="en-US" sz="2500">
+                <a:sym typeface="+mn-ea"/>
+              </a:rPr>
+              <a:t>продукт </a:t>
+            </a:r>
+            <a:r>
+              <a:rPr lang="en-US" sz="2500">
+                <a:sym typeface="+mn-ea"/>
+              </a:rPr>
+              <a:t>с другими платформами вещания в реальном времени.</a:t>
+            </a:r>
+            <a:endParaRPr lang="en-US" altLang="ru-RU" sz="2500"/>
           </a:p>
         </p:txBody>
       </p:sp>
@@ -7086,229 +5746,10 @@
           <a:bodyPr/>
           <a:p>
             <a:r>
-              <a:rPr lang="" altLang="en-US"/>
-              <a:t>Задачи</a:t>
-            </a:r>
-            <a:endParaRPr lang="" altLang="en-US"/>
-          </a:p>
-        </p:txBody>
-      </p:sp>
-      <p:sp>
-        <p:nvSpPr>
-          <p:cNvPr id="3" name="Замещающее содержимое 2"/>
-          <p:cNvSpPr>
-            <a:spLocks noGrp="1"/>
-          </p:cNvSpPr>
-          <p:nvPr>
-            <p:ph idx="1"/>
-          </p:nvPr>
-        </p:nvSpPr>
-        <p:spPr/>
-        <p:txBody>
-          <a:bodyPr>
-            <a:normAutofit lnSpcReduction="10000"/>
-          </a:bodyPr>
-          <a:p>
-            <a:pPr>
-              <a:lnSpc>
-                <a:spcPct val="150000"/>
-              </a:lnSpc>
-            </a:pPr>
-            <a:r>
-              <a:rPr lang="" altLang="en-US" sz="2500"/>
-              <a:t>Изучить разновидности технологий при создании видео чата.</a:t>
-            </a:r>
-            <a:endParaRPr lang="en-US" sz="2500"/>
-          </a:p>
-          <a:p>
-            <a:pPr>
-              <a:lnSpc>
-                <a:spcPct val="150000"/>
-              </a:lnSpc>
-            </a:pPr>
-            <a:r>
-              <a:rPr lang="en-US" sz="2500"/>
-              <a:t>Изучить теоретические сведения по стандарту webRTC;</a:t>
-            </a:r>
-            <a:endParaRPr lang="en-US" sz="2500"/>
-          </a:p>
-          <a:p>
-            <a:pPr>
-              <a:lnSpc>
-                <a:spcPct val="150000"/>
-              </a:lnSpc>
-            </a:pPr>
-            <a:r>
-              <a:rPr lang="en-US" sz="2500"/>
-              <a:t>Разработать программный продукт - видео чат - для организации передачи потоковых данных между браузерами </a:t>
-            </a:r>
-            <a:r>
-              <a:rPr lang="" altLang="en-US" sz="2500"/>
-              <a:t>на основе стандарта webRTC</a:t>
-            </a:r>
-            <a:r>
-              <a:rPr lang="en-US" sz="2500"/>
-              <a:t>;</a:t>
-            </a:r>
-            <a:endParaRPr lang="en-US" sz="2500"/>
-          </a:p>
-          <a:p>
-            <a:pPr>
-              <a:lnSpc>
-                <a:spcPct val="150000"/>
-              </a:lnSpc>
-            </a:pPr>
-            <a:r>
-              <a:rPr lang="en-US" sz="2500"/>
-              <a:t>Сравнение разработанного проекта с другими платформами вещания в реальном времени.</a:t>
-            </a:r>
-            <a:endParaRPr lang="en-US" sz="2500"/>
-          </a:p>
-        </p:txBody>
-      </p:sp>
-    </p:spTree>
-  </p:cSld>
-  <p:clrMapOvr>
-    <a:masterClrMapping/>
-  </p:clrMapOvr>
-</p:sld>
-</file>
-
-<file path=ppt/slides/slide4.xml><?xml version="1.0" encoding="utf-8"?>
-<p:sld xmlns:a="http://schemas.openxmlformats.org/drawingml/2006/main" xmlns:r="http://schemas.openxmlformats.org/officeDocument/2006/relationships" xmlns:p="http://schemas.openxmlformats.org/presentationml/2006/main">
-  <p:cSld>
-    <p:spTree>
-      <p:nvGrpSpPr>
-        <p:cNvPr id="1" name=""/>
-        <p:cNvGrpSpPr/>
-        <p:nvPr/>
-      </p:nvGrpSpPr>
-      <p:grpSpPr/>
-      <p:sp>
-        <p:nvSpPr>
-          <p:cNvPr id="2" name="Заголовок 1"/>
-          <p:cNvSpPr>
-            <a:spLocks noGrp="1"/>
-          </p:cNvSpPr>
-          <p:nvPr>
-            <p:ph type="title"/>
-          </p:nvPr>
-        </p:nvSpPr>
-        <p:spPr/>
-        <p:txBody>
-          <a:bodyPr/>
-          <a:p>
-            <a:r>
-              <a:rPr lang="" altLang="en-US"/>
-              <a:t>Видео чат</a:t>
-            </a:r>
-            <a:endParaRPr lang="" altLang="en-US"/>
-          </a:p>
-        </p:txBody>
-      </p:sp>
-      <p:sp>
-        <p:nvSpPr>
-          <p:cNvPr id="3" name="Замещающее содержимое 2"/>
-          <p:cNvSpPr>
-            <a:spLocks noGrp="1"/>
-          </p:cNvSpPr>
-          <p:nvPr>
-            <p:ph idx="1"/>
-          </p:nvPr>
-        </p:nvSpPr>
-        <p:spPr/>
-        <p:txBody>
-          <a:bodyPr>
-            <a:normAutofit/>
-          </a:bodyPr>
-          <a:p>
-            <a:pPr marL="0" indent="0">
-              <a:lnSpc>
-                <a:spcPct val="150000"/>
-              </a:lnSpc>
-              <a:buNone/>
-            </a:pPr>
-            <a:r>
-              <a:rPr lang="" altLang="en-US" sz="2500"/>
-              <a:t>О</a:t>
-            </a:r>
-            <a:r>
-              <a:rPr lang="en-US" sz="2500"/>
-              <a:t>нлайн-сервис, позволяющий пользователям Интернета общаться, в дополнение к текстовой переписке, в аудио и видео (посредством веб-камеры) режиме.</a:t>
-            </a:r>
-            <a:endParaRPr lang="en-US" sz="2500"/>
-          </a:p>
-        </p:txBody>
-      </p:sp>
-    </p:spTree>
-  </p:cSld>
-  <p:clrMapOvr>
-    <a:masterClrMapping/>
-  </p:clrMapOvr>
-</p:sld>
-</file>
-
-<file path=ppt/slides/slide5.xml><?xml version="1.0" encoding="utf-8"?>
-<p:sld xmlns:a="http://schemas.openxmlformats.org/drawingml/2006/main" xmlns:r="http://schemas.openxmlformats.org/officeDocument/2006/relationships" xmlns:p="http://schemas.openxmlformats.org/presentationml/2006/main">
-  <p:cSld>
-    <p:spTree>
-      <p:nvGrpSpPr>
-        <p:cNvPr id="1" name=""/>
-        <p:cNvGrpSpPr/>
-        <p:nvPr/>
-      </p:nvGrpSpPr>
-      <p:grpSpPr/>
-      <p:sp>
-        <p:nvSpPr>
-          <p:cNvPr id="2" name="Заголовок 1"/>
-          <p:cNvSpPr>
-            <a:spLocks noGrp="1"/>
-          </p:cNvSpPr>
-          <p:nvPr>
-            <p:ph type="title"/>
-          </p:nvPr>
-        </p:nvSpPr>
-        <p:spPr/>
-        <p:txBody>
-          <a:bodyPr>
-            <a:normAutofit fontScale="90000"/>
-          </a:bodyPr>
-          <a:p>
-            <a:r>
-              <a:rPr lang="" altLang="en-US"/>
+              <a:rPr lang="en-US" altLang="en-US" sz="3600"/>
               <a:t>Технологии для реализации видео чатов</a:t>
             </a:r>
-            <a:endParaRPr lang="" altLang="en-US"/>
-          </a:p>
-        </p:txBody>
-      </p:sp>
-      <p:sp>
-        <p:nvSpPr>
-          <p:cNvPr id="3" name="Замещающее содержимое 2"/>
-          <p:cNvSpPr>
-            <a:spLocks noGrp="1"/>
-          </p:cNvSpPr>
-          <p:nvPr>
-            <p:ph idx="1"/>
-          </p:nvPr>
-        </p:nvSpPr>
-        <p:spPr/>
-        <p:txBody>
-          <a:bodyPr>
-            <a:normAutofit/>
-          </a:bodyPr>
-          <a:p>
-            <a:pPr marL="0" indent="0">
-              <a:lnSpc>
-                <a:spcPct val="150000"/>
-              </a:lnSpc>
-              <a:buNone/>
-            </a:pPr>
-            <a:r>
-              <a:rPr lang="" altLang="en-US" sz="2500"/>
-              <a:t>	</a:t>
-            </a:r>
-            <a:endParaRPr lang="" altLang="en-US" sz="2500"/>
+            <a:endParaRPr lang="en-US" altLang="en-US" sz="3600"/>
           </a:p>
         </p:txBody>
       </p:sp>
@@ -7328,8 +5769,8 @@
         </p:blipFill>
         <p:spPr>
           <a:xfrm>
-            <a:off x="1758950" y="2719070"/>
-            <a:ext cx="1914525" cy="1914525"/>
+            <a:off x="1142365" y="1691005"/>
+            <a:ext cx="1529715" cy="1529715"/>
           </a:xfrm>
           <a:prstGeom prst="rect">
             <a:avLst/>
@@ -7352,14 +5793,657 @@
         </p:blipFill>
         <p:spPr>
           <a:xfrm>
-            <a:off x="7629525" y="2223770"/>
-            <a:ext cx="2428875" cy="2905125"/>
+            <a:off x="768350" y="3862705"/>
+            <a:ext cx="2277110" cy="2723515"/>
           </a:xfrm>
           <a:prstGeom prst="rect">
             <a:avLst/>
           </a:prstGeom>
         </p:spPr>
       </p:pic>
+      <p:sp>
+        <p:nvSpPr>
+          <p:cNvPr id="5" name="Текстовое поле 4"/>
+          <p:cNvSpPr txBox="1"/>
+          <p:nvPr/>
+        </p:nvSpPr>
+        <p:spPr>
+          <a:xfrm>
+            <a:off x="3414395" y="1456055"/>
+            <a:ext cx="7719695" cy="1640205"/>
+          </a:xfrm>
+          <a:prstGeom prst="rect">
+            <a:avLst/>
+          </a:prstGeom>
+          <a:noFill/>
+        </p:spPr>
+        <p:txBody>
+          <a:bodyPr wrap="square" rtlCol="0" anchor="t">
+            <a:spAutoFit/>
+          </a:bodyPr>
+          <a:p>
+            <a:pPr>
+              <a:lnSpc>
+                <a:spcPct val="140000"/>
+              </a:lnSpc>
+            </a:pPr>
+            <a:r>
+              <a:rPr lang="" altLang="en-US">
+                <a:sym typeface="+mn-ea"/>
+              </a:rPr>
+              <a:t>Недостатки:</a:t>
+            </a:r>
+            <a:endParaRPr lang="" altLang="en-US">
+              <a:sym typeface="+mn-ea"/>
+            </a:endParaRPr>
+          </a:p>
+          <a:p>
+            <a:pPr marL="285750" indent="-285750">
+              <a:lnSpc>
+                <a:spcPct val="140000"/>
+              </a:lnSpc>
+              <a:buFont typeface="Arial" panose="020B0604020202020204" pitchFamily="34" charset="0"/>
+              <a:buChar char="•"/>
+            </a:pPr>
+            <a:r>
+              <a:rPr lang="" altLang="en-US">
+                <a:sym typeface="+mn-ea"/>
+              </a:rPr>
+              <a:t>р</a:t>
+            </a:r>
+            <a:r>
+              <a:rPr lang="en-US" altLang="en-US">
+                <a:sym typeface="+mn-ea"/>
+              </a:rPr>
+              <a:t>аскрытие персональных данных</a:t>
+            </a:r>
+            <a:r>
+              <a:rPr lang="" altLang="en-US">
+                <a:sym typeface="+mn-ea"/>
+              </a:rPr>
+              <a:t>;</a:t>
+            </a:r>
+            <a:endParaRPr lang="en-US" altLang="en-US"/>
+          </a:p>
+          <a:p>
+            <a:pPr marL="285750" indent="-285750">
+              <a:lnSpc>
+                <a:spcPct val="140000"/>
+              </a:lnSpc>
+              <a:buFont typeface="Arial" panose="020B0604020202020204" pitchFamily="34" charset="0"/>
+              <a:buChar char="•"/>
+            </a:pPr>
+            <a:r>
+              <a:rPr lang="" altLang="en-US">
+                <a:sym typeface="+mn-ea"/>
+              </a:rPr>
+              <a:t>п</a:t>
+            </a:r>
+            <a:r>
+              <a:rPr lang="en-US" altLang="en-US">
+                <a:sym typeface="+mn-ea"/>
+              </a:rPr>
+              <a:t>олучение контроля над управлением веб-камерой и микрофоном</a:t>
+            </a:r>
+            <a:r>
+              <a:rPr lang="" altLang="en-US">
+                <a:sym typeface="+mn-ea"/>
+              </a:rPr>
+              <a:t>;</a:t>
+            </a:r>
+            <a:endParaRPr lang="en-US" altLang="en-US"/>
+          </a:p>
+          <a:p>
+            <a:pPr marL="285750" indent="-285750">
+              <a:lnSpc>
+                <a:spcPct val="140000"/>
+              </a:lnSpc>
+              <a:buFont typeface="Arial" panose="020B0604020202020204" pitchFamily="34" charset="0"/>
+              <a:buChar char="•"/>
+            </a:pPr>
+            <a:r>
+              <a:rPr lang="" altLang="en-US">
+                <a:sym typeface="+mn-ea"/>
+              </a:rPr>
+              <a:t>в</a:t>
+            </a:r>
+            <a:r>
+              <a:rPr lang="en-US" altLang="en-US">
+                <a:sym typeface="+mn-ea"/>
+              </a:rPr>
+              <a:t>недрение рекламы в операционную систему пользователя</a:t>
+            </a:r>
+            <a:r>
+              <a:rPr lang="" altLang="en-US">
+                <a:sym typeface="+mn-ea"/>
+              </a:rPr>
+              <a:t>.</a:t>
+            </a:r>
+            <a:endParaRPr lang="" altLang="en-US">
+              <a:sym typeface="+mn-ea"/>
+            </a:endParaRPr>
+          </a:p>
+        </p:txBody>
+      </p:sp>
+      <p:sp>
+        <p:nvSpPr>
+          <p:cNvPr id="7" name="Текстовое поле 6"/>
+          <p:cNvSpPr txBox="1"/>
+          <p:nvPr/>
+        </p:nvSpPr>
+        <p:spPr>
+          <a:xfrm>
+            <a:off x="3414395" y="3639820"/>
+            <a:ext cx="8174990" cy="3189605"/>
+          </a:xfrm>
+          <a:prstGeom prst="rect">
+            <a:avLst/>
+          </a:prstGeom>
+          <a:noFill/>
+        </p:spPr>
+        <p:txBody>
+          <a:bodyPr wrap="square" rtlCol="0" anchor="t">
+            <a:spAutoFit/>
+          </a:bodyPr>
+          <a:p>
+            <a:pPr>
+              <a:lnSpc>
+                <a:spcPct val="140000"/>
+              </a:lnSpc>
+            </a:pPr>
+            <a:r>
+              <a:rPr lang="" altLang="en-US">
+                <a:sym typeface="+mn-ea"/>
+              </a:rPr>
+              <a:t>Преимущества:</a:t>
+            </a:r>
+            <a:endParaRPr lang="" altLang="en-US">
+              <a:sym typeface="+mn-ea"/>
+            </a:endParaRPr>
+          </a:p>
+          <a:p>
+            <a:pPr marL="285750" indent="-285750">
+              <a:lnSpc>
+                <a:spcPct val="140000"/>
+              </a:lnSpc>
+              <a:buFont typeface="Arial" panose="020B0604020202020204" pitchFamily="34" charset="0"/>
+              <a:buChar char="•"/>
+            </a:pPr>
+            <a:r>
+              <a:rPr lang="" altLang="en-US">
+                <a:sym typeface="+mn-ea"/>
+              </a:rPr>
+              <a:t>н</a:t>
+            </a:r>
+            <a:r>
+              <a:rPr lang="en-US" altLang="en-US">
+                <a:sym typeface="+mn-ea"/>
+              </a:rPr>
+              <a:t>е требуется установка ПО</a:t>
+            </a:r>
+            <a:r>
+              <a:rPr lang="" altLang="en-US">
+                <a:sym typeface="+mn-ea"/>
+              </a:rPr>
+              <a:t>;</a:t>
+            </a:r>
+            <a:endParaRPr lang="en-US" altLang="en-US"/>
+          </a:p>
+          <a:p>
+            <a:pPr marL="285750" indent="-285750">
+              <a:lnSpc>
+                <a:spcPct val="140000"/>
+              </a:lnSpc>
+              <a:buFont typeface="Arial" panose="020B0604020202020204" pitchFamily="34" charset="0"/>
+              <a:buChar char="•"/>
+            </a:pPr>
+            <a:r>
+              <a:rPr lang="" altLang="en-US">
+                <a:sym typeface="+mn-ea"/>
+              </a:rPr>
+              <a:t>в</a:t>
+            </a:r>
+            <a:r>
+              <a:rPr lang="en-US" altLang="en-US">
+                <a:sym typeface="+mn-ea"/>
+              </a:rPr>
+              <a:t>ысокое качество связи</a:t>
+            </a:r>
+            <a:r>
+              <a:rPr lang="" altLang="en-US">
+                <a:sym typeface="+mn-ea"/>
+              </a:rPr>
+              <a:t>;</a:t>
+            </a:r>
+            <a:endParaRPr lang="en-US" altLang="en-US"/>
+          </a:p>
+          <a:p>
+            <a:pPr marL="285750" indent="-285750">
+              <a:lnSpc>
+                <a:spcPct val="140000"/>
+              </a:lnSpc>
+              <a:buFont typeface="Arial" panose="020B0604020202020204" pitchFamily="34" charset="0"/>
+              <a:buChar char="•"/>
+            </a:pPr>
+            <a:r>
+              <a:rPr lang="" altLang="en-US">
+                <a:sym typeface="+mn-ea"/>
+              </a:rPr>
+              <a:t>в</a:t>
+            </a:r>
+            <a:r>
+              <a:rPr lang="en-US" altLang="en-US">
+                <a:sym typeface="+mn-ea"/>
+              </a:rPr>
+              <a:t>ысокий уровень безопасности - все соединения защищены и зашифрованы на протокольном уровне с помощью SSL/TLS и SRTP;</a:t>
+            </a:r>
+            <a:endParaRPr lang="en-US" altLang="en-US"/>
+          </a:p>
+          <a:p>
+            <a:pPr marL="285750" indent="-285750">
+              <a:lnSpc>
+                <a:spcPct val="140000"/>
+              </a:lnSpc>
+              <a:buFont typeface="Arial" panose="020B0604020202020204" pitchFamily="34" charset="0"/>
+              <a:buChar char="•"/>
+            </a:pPr>
+            <a:r>
+              <a:rPr lang="" altLang="en-US">
+                <a:sym typeface="+mn-ea"/>
+              </a:rPr>
+              <a:t>е</a:t>
+            </a:r>
+            <a:r>
+              <a:rPr lang="en-US" altLang="en-US">
+                <a:sym typeface="+mn-ea"/>
+              </a:rPr>
+              <a:t>сть встроенный механизм захвата контента</a:t>
+            </a:r>
+            <a:r>
+              <a:rPr lang="" altLang="en-US">
+                <a:sym typeface="+mn-ea"/>
+              </a:rPr>
+              <a:t>;</a:t>
+            </a:r>
+            <a:endParaRPr lang="en-US" altLang="en-US"/>
+          </a:p>
+          <a:p>
+            <a:pPr marL="285750" indent="-285750">
+              <a:lnSpc>
+                <a:spcPct val="140000"/>
+              </a:lnSpc>
+              <a:buFont typeface="Arial" panose="020B0604020202020204" pitchFamily="34" charset="0"/>
+              <a:buChar char="•"/>
+            </a:pPr>
+            <a:r>
+              <a:rPr lang="" altLang="en-US">
+                <a:sym typeface="+mn-ea"/>
+              </a:rPr>
+              <a:t>в</a:t>
+            </a:r>
+            <a:r>
+              <a:rPr lang="en-US" altLang="en-US">
+                <a:sym typeface="+mn-ea"/>
+              </a:rPr>
+              <a:t>озможность реализации любого интерфейса управления</a:t>
+            </a:r>
+            <a:r>
+              <a:rPr lang="" altLang="en-US">
+                <a:sym typeface="+mn-ea"/>
+              </a:rPr>
+              <a:t>;</a:t>
+            </a:r>
+            <a:endParaRPr lang="en-US" altLang="en-US"/>
+          </a:p>
+          <a:p>
+            <a:pPr marL="285750" indent="-285750">
+              <a:lnSpc>
+                <a:spcPct val="140000"/>
+              </a:lnSpc>
+              <a:buFont typeface="Arial" panose="020B0604020202020204" pitchFamily="34" charset="0"/>
+              <a:buChar char="•"/>
+            </a:pPr>
+            <a:r>
+              <a:rPr lang="" altLang="en-US">
+                <a:sym typeface="+mn-ea"/>
+              </a:rPr>
+              <a:t>к</a:t>
+            </a:r>
+            <a:r>
+              <a:rPr lang="en-US" altLang="en-US">
+                <a:sym typeface="+mn-ea"/>
+              </a:rPr>
+              <a:t>росс-платформенность</a:t>
+            </a:r>
+            <a:r>
+              <a:rPr lang="" altLang="en-US">
+                <a:sym typeface="+mn-ea"/>
+              </a:rPr>
+              <a:t>.</a:t>
+            </a:r>
+            <a:endParaRPr lang="" altLang="en-US">
+              <a:sym typeface="+mn-ea"/>
+            </a:endParaRPr>
+          </a:p>
+        </p:txBody>
+      </p:sp>
+    </p:spTree>
+  </p:cSld>
+  <p:clrMapOvr>
+    <a:masterClrMapping/>
+  </p:clrMapOvr>
+</p:sld>
+</file>
+
+<file path=ppt/slides/slide4.xml><?xml version="1.0" encoding="utf-8"?>
+<p:sld xmlns:a="http://schemas.openxmlformats.org/drawingml/2006/main" xmlns:r="http://schemas.openxmlformats.org/officeDocument/2006/relationships" xmlns:p="http://schemas.openxmlformats.org/presentationml/2006/main">
+  <p:cSld>
+    <p:spTree>
+      <p:nvGrpSpPr>
+        <p:cNvPr id="1" name=""/>
+        <p:cNvGrpSpPr/>
+        <p:nvPr/>
+      </p:nvGrpSpPr>
+      <p:grpSpPr/>
+      <p:sp>
+        <p:nvSpPr>
+          <p:cNvPr id="2" name="Заголовок 1"/>
+          <p:cNvSpPr>
+            <a:spLocks noGrp="1"/>
+          </p:cNvSpPr>
+          <p:nvPr>
+            <p:ph type="title"/>
+          </p:nvPr>
+        </p:nvSpPr>
+        <p:spPr>
+          <a:xfrm>
+            <a:off x="838200" y="365125"/>
+            <a:ext cx="11062970" cy="1325880"/>
+          </a:xfrm>
+        </p:spPr>
+        <p:txBody>
+          <a:bodyPr/>
+          <a:p>
+            <a:pPr>
+              <a:lnSpc>
+                <a:spcPct val="110000"/>
+              </a:lnSpc>
+            </a:pPr>
+            <a:r>
+              <a:rPr lang="" altLang="ru-RU" sz="3200">
+                <a:sym typeface="+mn-ea"/>
+              </a:rPr>
+              <a:t>С</a:t>
+            </a:r>
+            <a:r>
+              <a:rPr lang="ru-RU" altLang="en-US" sz="3200">
+                <a:sym typeface="+mn-ea"/>
+              </a:rPr>
+              <a:t>хематический процесс установления р2р соединения </a:t>
+            </a:r>
+            <a:br>
+              <a:rPr lang="ru-RU" altLang="en-US" sz="3200">
+                <a:sym typeface="+mn-ea"/>
+              </a:rPr>
+            </a:br>
+            <a:r>
+              <a:rPr lang="ru-RU" altLang="en-US" sz="3200">
+                <a:sym typeface="+mn-ea"/>
+              </a:rPr>
+              <a:t>с помощью WebRTC</a:t>
+            </a:r>
+            <a:endParaRPr lang="ru-RU" altLang="en-US" sz="3200">
+              <a:sym typeface="+mn-ea"/>
+            </a:endParaRPr>
+          </a:p>
+        </p:txBody>
+      </p:sp>
+      <p:pic>
+        <p:nvPicPr>
+          <p:cNvPr id="5" name="Замещающее содержимое 4"/>
+          <p:cNvPicPr>
+            <a:picLocks noChangeAspect="1"/>
+          </p:cNvPicPr>
+          <p:nvPr>
+            <p:ph idx="1"/>
+          </p:nvPr>
+        </p:nvPicPr>
+        <p:blipFill>
+          <a:blip r:embed="rId1"/>
+          <a:stretch>
+            <a:fillRect/>
+          </a:stretch>
+        </p:blipFill>
+        <p:spPr>
+          <a:xfrm>
+            <a:off x="1442085" y="2181225"/>
+            <a:ext cx="9491980" cy="3799205"/>
+          </a:xfrm>
+          <a:prstGeom prst="rect">
+            <a:avLst/>
+          </a:prstGeom>
+        </p:spPr>
+      </p:pic>
+    </p:spTree>
+  </p:cSld>
+  <p:clrMapOvr>
+    <a:masterClrMapping/>
+  </p:clrMapOvr>
+</p:sld>
+</file>
+
+<file path=ppt/slides/slide5.xml><?xml version="1.0" encoding="utf-8"?>
+<p:sld xmlns:a="http://schemas.openxmlformats.org/drawingml/2006/main" xmlns:r="http://schemas.openxmlformats.org/officeDocument/2006/relationships" xmlns:p="http://schemas.openxmlformats.org/presentationml/2006/main">
+  <p:cSld>
+    <p:spTree>
+      <p:nvGrpSpPr>
+        <p:cNvPr id="1" name=""/>
+        <p:cNvGrpSpPr/>
+        <p:nvPr/>
+      </p:nvGrpSpPr>
+      <p:grpSpPr/>
+      <p:sp>
+        <p:nvSpPr>
+          <p:cNvPr id="2" name="Заголовок 1"/>
+          <p:cNvSpPr>
+            <a:spLocks noGrp="1"/>
+          </p:cNvSpPr>
+          <p:nvPr>
+            <p:ph type="title"/>
+          </p:nvPr>
+        </p:nvSpPr>
+        <p:spPr>
+          <a:xfrm>
+            <a:off x="838200" y="365125"/>
+            <a:ext cx="10515600" cy="1325563"/>
+          </a:xfrm>
+        </p:spPr>
+        <p:txBody>
+          <a:bodyPr/>
+          <a:p>
+            <a:r>
+              <a:rPr lang="en-US" altLang="en-US" sz="3600">
+                <a:sym typeface="+mn-ea"/>
+              </a:rPr>
+              <a:t>Демонстрация работы программы</a:t>
+            </a:r>
+            <a:endParaRPr lang="en-US" altLang="en-US" sz="3600"/>
+          </a:p>
+        </p:txBody>
+      </p:sp>
+      <p:pic>
+        <p:nvPicPr>
+          <p:cNvPr id="6" name="Замещающее содержимое 5"/>
+          <p:cNvPicPr>
+            <a:picLocks noChangeAspect="1"/>
+          </p:cNvPicPr>
+          <p:nvPr>
+            <p:ph idx="1"/>
+          </p:nvPr>
+        </p:nvPicPr>
+        <p:blipFill>
+          <a:blip r:embed="rId1"/>
+          <a:stretch>
+            <a:fillRect/>
+          </a:stretch>
+        </p:blipFill>
+        <p:spPr>
+          <a:xfrm>
+            <a:off x="838200" y="1818005"/>
+            <a:ext cx="3157855" cy="1257300"/>
+          </a:xfrm>
+          <a:prstGeom prst="rect">
+            <a:avLst/>
+          </a:prstGeom>
+        </p:spPr>
+      </p:pic>
+      <p:pic>
+        <p:nvPicPr>
+          <p:cNvPr id="3" name="Изображение 2"/>
+          <p:cNvPicPr>
+            <a:picLocks noChangeAspect="1"/>
+          </p:cNvPicPr>
+          <p:nvPr/>
+        </p:nvPicPr>
+        <p:blipFill>
+          <a:blip r:embed="rId2"/>
+          <a:stretch>
+            <a:fillRect/>
+          </a:stretch>
+        </p:blipFill>
+        <p:spPr>
+          <a:xfrm>
+            <a:off x="2867025" y="2332990"/>
+            <a:ext cx="4477385" cy="2480310"/>
+          </a:xfrm>
+          <a:prstGeom prst="rect">
+            <a:avLst/>
+          </a:prstGeom>
+        </p:spPr>
+      </p:pic>
+      <p:pic>
+        <p:nvPicPr>
+          <p:cNvPr id="5" name="Замещающее содержимое 4"/>
+          <p:cNvPicPr>
+            <a:picLocks noChangeAspect="1"/>
+          </p:cNvPicPr>
+          <p:nvPr/>
+        </p:nvPicPr>
+        <p:blipFill>
+          <a:blip r:embed="rId3"/>
+          <a:stretch>
+            <a:fillRect/>
+          </a:stretch>
+        </p:blipFill>
+        <p:spPr>
+          <a:xfrm>
+            <a:off x="6598285" y="4013200"/>
+            <a:ext cx="4916170" cy="2727325"/>
+          </a:xfrm>
+          <a:prstGeom prst="rect">
+            <a:avLst/>
+          </a:prstGeom>
+        </p:spPr>
+      </p:pic>
+      <p:sp>
+        <p:nvSpPr>
+          <p:cNvPr id="4" name="Текстовое поле 3"/>
+          <p:cNvSpPr txBox="1"/>
+          <p:nvPr/>
+        </p:nvSpPr>
+        <p:spPr>
+          <a:xfrm>
+            <a:off x="934085" y="2573655"/>
+            <a:ext cx="362585" cy="368300"/>
+          </a:xfrm>
+          <a:prstGeom prst="rect">
+            <a:avLst/>
+          </a:prstGeom>
+          <a:noFill/>
+        </p:spPr>
+        <p:txBody>
+          <a:bodyPr wrap="square" rtlCol="0" anchor="t">
+            <a:spAutoFit/>
+          </a:bodyPr>
+          <a:p>
+            <a:r>
+              <a:rPr lang="" altLang="en-US" b="1">
+                <a:sym typeface="+mn-ea"/>
+              </a:rPr>
+              <a:t>1</a:t>
+            </a:r>
+            <a:endParaRPr lang="" altLang="en-US" b="1">
+              <a:sym typeface="+mn-ea"/>
+            </a:endParaRPr>
+          </a:p>
+        </p:txBody>
+      </p:sp>
+      <p:sp>
+        <p:nvSpPr>
+          <p:cNvPr id="7" name="Текстовое поле 6"/>
+          <p:cNvSpPr txBox="1"/>
+          <p:nvPr/>
+        </p:nvSpPr>
+        <p:spPr>
+          <a:xfrm>
+            <a:off x="2867025" y="4445000"/>
+            <a:ext cx="316865" cy="368300"/>
+          </a:xfrm>
+          <a:prstGeom prst="rect">
+            <a:avLst/>
+          </a:prstGeom>
+          <a:noFill/>
+        </p:spPr>
+        <p:txBody>
+          <a:bodyPr wrap="none" rtlCol="0" anchor="t">
+            <a:spAutoFit/>
+          </a:bodyPr>
+          <a:p>
+            <a:r>
+              <a:rPr lang="" altLang="en-US" b="1">
+                <a:sym typeface="+mn-ea"/>
+              </a:rPr>
+              <a:t>2</a:t>
+            </a:r>
+            <a:endParaRPr lang="" altLang="en-US" b="1">
+              <a:sym typeface="+mn-ea"/>
+            </a:endParaRPr>
+          </a:p>
+        </p:txBody>
+      </p:sp>
+      <p:sp>
+        <p:nvSpPr>
+          <p:cNvPr id="8" name="Текстовое поле 7"/>
+          <p:cNvSpPr txBox="1"/>
+          <p:nvPr/>
+        </p:nvSpPr>
+        <p:spPr>
+          <a:xfrm>
+            <a:off x="6598285" y="6372225"/>
+            <a:ext cx="316865" cy="368300"/>
+          </a:xfrm>
+          <a:prstGeom prst="rect">
+            <a:avLst/>
+          </a:prstGeom>
+          <a:noFill/>
+        </p:spPr>
+        <p:txBody>
+          <a:bodyPr wrap="none" rtlCol="0" anchor="t">
+            <a:spAutoFit/>
+          </a:bodyPr>
+          <a:p>
+            <a:r>
+              <a:rPr lang="" altLang="en-US" b="1">
+                <a:sym typeface="+mn-ea"/>
+              </a:rPr>
+              <a:t>3</a:t>
+            </a:r>
+            <a:endParaRPr lang="" altLang="en-US" b="1">
+              <a:sym typeface="+mn-ea"/>
+            </a:endParaRPr>
+          </a:p>
+        </p:txBody>
+      </p:sp>
     </p:spTree>
   </p:cSld>
   <p:clrMapOvr>
@@ -7390,98 +6474,100 @@
         </p:nvSpPr>
         <p:spPr/>
         <p:txBody>
-          <a:bodyPr>
-            <a:normAutofit fontScale="90000"/>
-          </a:bodyPr>
-          <a:p>
-            <a:r>
-              <a:rPr lang="" altLang="en-US"/>
-              <a:t>Угрозы безопасности при использовании </a:t>
-            </a:r>
-            <a:br>
-              <a:rPr lang="" altLang="en-US"/>
-            </a:br>
-            <a:r>
-              <a:rPr lang="" altLang="en-US"/>
-              <a:t>Flash player видеочата</a:t>
-            </a:r>
-            <a:endParaRPr lang="" altLang="en-US"/>
-          </a:p>
-        </p:txBody>
-      </p:sp>
-      <p:sp>
-        <p:nvSpPr>
-          <p:cNvPr id="3" name="Замещающее содержимое 2"/>
-          <p:cNvSpPr>
-            <a:spLocks noGrp="1"/>
-          </p:cNvSpPr>
+          <a:bodyPr/>
+          <a:p>
+            <a:r>
+              <a:rPr lang="en-US" altLang="en-US" sz="3600">
+                <a:sym typeface="+mn-ea"/>
+              </a:rPr>
+              <a:t>Демонстрация работы программы </a:t>
+            </a:r>
+            <a:r>
+              <a:rPr lang="" altLang="en-US" sz="3600">
+                <a:sym typeface="+mn-ea"/>
+              </a:rPr>
+              <a:t>- видео</a:t>
+            </a:r>
+            <a:endParaRPr lang="" altLang="en-US" sz="3600">
+              <a:sym typeface="+mn-ea"/>
+            </a:endParaRPr>
+          </a:p>
+        </p:txBody>
+      </p:sp>
+      <p:pic>
+        <p:nvPicPr>
+          <p:cNvPr id="7" name="simplescreenrecorder-2019-11-19_17.38.14">
+            <a:hlinkClick r:id="" action="ppaction://media"/>
+          </p:cNvPr>
+          <p:cNvPicPr/>
           <p:nvPr>
             <p:ph idx="1"/>
-          </p:nvPr>
-        </p:nvSpPr>
-        <p:spPr/>
-        <p:txBody>
-          <a:bodyPr>
-            <a:normAutofit/>
-          </a:bodyPr>
-          <a:p>
-            <a:pPr>
-              <a:lnSpc>
-                <a:spcPct val="150000"/>
-              </a:lnSpc>
-            </a:pPr>
-            <a:r>
-              <a:rPr lang="" altLang="en-US" sz="2500"/>
-              <a:t>Раскрытие персональных данных</a:t>
-            </a:r>
-            <a:endParaRPr lang="" altLang="en-US" sz="2500"/>
-          </a:p>
-          <a:p>
-            <a:pPr>
-              <a:lnSpc>
-                <a:spcPct val="150000"/>
-              </a:lnSpc>
-            </a:pPr>
-            <a:r>
-              <a:rPr lang="" altLang="en-US" sz="2500"/>
-              <a:t>Получение контроля над управлением веб-камерой и микрофоном.</a:t>
-            </a:r>
-            <a:endParaRPr lang="" altLang="en-US" sz="2500"/>
-          </a:p>
-          <a:p>
-            <a:pPr>
-              <a:lnSpc>
-                <a:spcPct val="150000"/>
-              </a:lnSpc>
-            </a:pPr>
-            <a:r>
-              <a:rPr lang="" altLang="en-US" sz="2500"/>
-              <a:t>Внедрение рекламы в операционную систему пользователя</a:t>
-            </a:r>
-            <a:endParaRPr lang="" altLang="en-US" sz="2500"/>
-          </a:p>
-          <a:p>
-            <a:pPr>
-              <a:lnSpc>
-                <a:spcPct val="150000"/>
-              </a:lnSpc>
-            </a:pPr>
-            <a:endParaRPr lang="" altLang="en-US" sz="2500"/>
-          </a:p>
-          <a:p>
-            <a:pPr marL="0" indent="0">
-              <a:lnSpc>
-                <a:spcPct val="150000"/>
-              </a:lnSpc>
-              <a:buNone/>
-            </a:pPr>
-            <a:r>
-              <a:rPr lang="en-US" altLang="en-US" sz="2500">
-                <a:sym typeface="+mn-ea"/>
-              </a:rPr>
-              <a:t>181 уязвимость Flash, из которых 152 оценены как критичные.</a:t>
-            </a:r>
-            <a:endParaRPr lang="" altLang="en-US" sz="2500"/>
+            <a:videoFile r:link="rId1"/>
+            <p:extLst>
+              <p:ext uri="{DAA4B4D4-6D71-4841-9C94-3DE7FCFB9230}">
+                <p14:media xmlns:p14="http://schemas.microsoft.com/office/powerpoint/2010/main" r:link="rId2"/>
+              </p:ext>
+            </p:extLst>
+          </p:nvPr>
+        </p:nvPicPr>
+        <p:blipFill>
+          <a:blip r:embed="rId3"/>
+          <a:stretch>
+            <a:fillRect/>
+          </a:stretch>
+        </p:blipFill>
+        <p:spPr>
+          <a:xfrm>
+            <a:off x="2325992" y="1844675"/>
+            <a:ext cx="7540017" cy="4351338"/>
+          </a:xfrm>
+          <a:prstGeom prst="rect">
+            <a:avLst/>
+          </a:prstGeom>
+        </p:spPr>
+      </p:pic>
+      <p:sp>
+        <p:nvSpPr>
+          <p:cNvPr id="8" name="Прямоугольник 7"/>
+          <p:cNvSpPr/>
+          <p:nvPr/>
+        </p:nvSpPr>
+        <p:spPr>
+          <a:xfrm>
+            <a:off x="9723120" y="1651635"/>
+            <a:ext cx="937895" cy="4738370"/>
+          </a:xfrm>
+          <a:prstGeom prst="rect">
+            <a:avLst/>
+          </a:prstGeom>
+          <a:solidFill>
+            <a:schemeClr val="bg1"/>
+          </a:solidFill>
+          <a:ln>
+            <a:noFill/>
+          </a:ln>
+        </p:spPr>
+        <p:style>
+          <a:lnRef idx="2">
+            <a:schemeClr val="accent1">
+              <a:shade val="50000"/>
+            </a:schemeClr>
+          </a:lnRef>
+          <a:fillRef idx="1">
+            <a:schemeClr val="accent1"/>
+          </a:fillRef>
+          <a:effectRef idx="0">
+            <a:schemeClr val="accent1"/>
+          </a:effectRef>
+          <a:fontRef idx="minor">
+            <a:schemeClr val="lt1"/>
+          </a:fontRef>
+        </p:style>
+        <p:txBody>
+          <a:bodyPr rtlCol="0" anchor="ctr"/>
+          <a:p>
+            <a:pPr algn="ctr"/>
+            <a:endParaRPr lang="ru-RU" altLang="en-US"/>
           </a:p>
         </p:txBody>
       </p:sp>
@@ -7490,6 +6576,98 @@
   <p:clrMapOvr>
     <a:masterClrMapping/>
   </p:clrMapOvr>
+  <p:timing>
+    <p:tnLst>
+      <p:par>
+        <p:cTn id="1" dur="indefinite" restart="never" nodeType="tmRoot">
+          <p:childTnLst>
+            <p:video fullScrn="0">
+              <p:cMediaNode>
+                <p:cTn id="2" fill="hold" display="1">
+                  <p:stCondLst>
+                    <p:cond delay="indefinite"/>
+                  </p:stCondLst>
+                  <p:endCondLst>
+                    <p:cond evt="onNext">
+                      <p:tgtEl>
+                        <p:sldTgt/>
+                      </p:tgtEl>
+                    </p:cond>
+                    <p:cond evt="onPrev">
+                      <p:tgtEl>
+                        <p:sldTgt/>
+                      </p:tgtEl>
+                    </p:cond>
+                  </p:endCondLst>
+                </p:cTn>
+                <p:tgtEl>
+                  <p:spTgt spid="7"/>
+                </p:tgtEl>
+              </p:cMediaNode>
+            </p:video>
+            <p:seq concurrent="1" nextAc="seek">
+              <p:cTn id="3" restart="whenNotActive" fill="hold" evtFilter="cancelBubble" nodeType="interactiveSeq">
+                <p:stCondLst>
+                  <p:cond evt="onClick" delay="0">
+                    <p:tgtEl>
+                      <p:spTgt spid="7"/>
+                    </p:tgtEl>
+                  </p:cond>
+                </p:stCondLst>
+                <p:endSync evt="end" delay="0">
+                  <p:rtn val="all"/>
+                </p:endSync>
+                <p:childTnLst>
+                  <p:par>
+                    <p:cTn id="4" fill="hold">
+                      <p:stCondLst>
+                        <p:cond delay="0"/>
+                      </p:stCondLst>
+                      <p:childTnLst>
+                        <p:par>
+                          <p:cTn id="5" fill="hold">
+                            <p:stCondLst>
+                              <p:cond delay="0"/>
+                            </p:stCondLst>
+                            <p:childTnLst>
+                              <p:par>
+                                <p:cTn id="6" presetID="2" presetClass="mediacall" presetSubtype="0" fill="hold" nodeType="clickEffect">
+                                  <p:stCondLst>
+                                    <p:cond delay="0"/>
+                                  </p:stCondLst>
+                                  <p:childTnLst>
+                                    <p:cmd type="call" cmd="togglePause">
+                                      <p:cBhvr additive="base">
+                                        <p:cTn id="7" dur="1" fill="hold"/>
+                                        <p:tgtEl>
+                                          <p:spTgt spid="7"/>
+                                        </p:tgtEl>
+                                      </p:cBhvr>
+                                    </p:cmd>
+                                  </p:childTnLst>
+                                </p:cTn>
+                              </p:par>
+                            </p:childTnLst>
+                          </p:cTn>
+                        </p:par>
+                      </p:childTnLst>
+                    </p:cTn>
+                  </p:par>
+                </p:childTnLst>
+              </p:cTn>
+              <p:nextCondLst>
+                <p:cond evt="onClick" delay="0">
+                  <p:tgtEl>
+                    <p:spTgt spid="7"/>
+                  </p:tgtEl>
+                </p:cond>
+              </p:nextCondLst>
+            </p:seq>
+          </p:childTnLst>
+        </p:cTn>
+      </p:par>
+    </p:tnLst>
+  </p:timing>
 </p:sld>
 </file>
 
@@ -7515,78 +6693,137 @@
         </p:nvSpPr>
         <p:spPr/>
         <p:txBody>
-          <a:bodyPr>
-            <a:normAutofit fontScale="90000"/>
+          <a:bodyPr/>
+          <a:p>
+            <a:r>
+              <a:rPr lang="en-US" altLang="en-US" sz="3600"/>
+              <a:t>Реализованные функции программы</a:t>
+            </a:r>
+            <a:endParaRPr lang="en-US" altLang="en-US" sz="3600"/>
+          </a:p>
+        </p:txBody>
+      </p:sp>
+      <p:pic>
+        <p:nvPicPr>
+          <p:cNvPr id="48" name="Изображение 16"/>
+          <p:cNvPicPr>
+            <a:picLocks noChangeAspect="1"/>
+          </p:cNvPicPr>
+          <p:nvPr>
+            <p:ph idx="1"/>
+          </p:nvPr>
+        </p:nvPicPr>
+        <p:blipFill>
+          <a:blip r:embed="rId1"/>
+          <a:stretch>
+            <a:fillRect/>
+          </a:stretch>
+        </p:blipFill>
+        <p:spPr>
+          <a:xfrm>
+            <a:off x="7291705" y="2415540"/>
+            <a:ext cx="4267200" cy="2849245"/>
+          </a:xfrm>
+          <a:prstGeom prst="rect">
+            <a:avLst/>
+          </a:prstGeom>
+          <a:noFill/>
+          <a:ln>
+            <a:noFill/>
+          </a:ln>
+        </p:spPr>
+      </p:pic>
+      <p:sp>
+        <p:nvSpPr>
+          <p:cNvPr id="6" name="Текстовое поле 5"/>
+          <p:cNvSpPr txBox="1"/>
+          <p:nvPr/>
+        </p:nvSpPr>
+        <p:spPr>
+          <a:xfrm>
+            <a:off x="7291705" y="1783080"/>
+            <a:ext cx="3865880" cy="460375"/>
+          </a:xfrm>
+          <a:prstGeom prst="rect">
+            <a:avLst/>
+          </a:prstGeom>
+          <a:noFill/>
+        </p:spPr>
+        <p:txBody>
+          <a:bodyPr wrap="none" rtlCol="0" anchor="t">
+            <a:spAutoFit/>
           </a:bodyPr>
           <a:p>
             <a:r>
-              <a:rPr lang="ru-RU" altLang="en-US">
-                <a:sym typeface="+mn-ea"/>
-              </a:rPr>
-              <a:t>WebRTC (Web Real-Time Communications) </a:t>
-            </a:r>
-            <a:endParaRPr lang="en-US" altLang="ru-RU">
+              <a:rPr lang="en-US" altLang="en-US" sz="2400">
+                <a:sym typeface="+mn-ea"/>
+              </a:rPr>
+              <a:t>Создание и установка SDP</a:t>
+            </a:r>
+            <a:endParaRPr lang="en-US" altLang="en-US" sz="2400">
               <a:sym typeface="+mn-ea"/>
             </a:endParaRPr>
           </a:p>
         </p:txBody>
       </p:sp>
-      <p:sp>
-        <p:nvSpPr>
-          <p:cNvPr id="3" name="Замещающее содержимое 2"/>
-          <p:cNvSpPr>
-            <a:spLocks noGrp="1"/>
-          </p:cNvSpPr>
-          <p:nvPr>
-            <p:ph idx="1"/>
-          </p:nvPr>
-        </p:nvSpPr>
+      <p:pic>
+        <p:nvPicPr>
+          <p:cNvPr id="12" name="Изображение 15"/>
+          <p:cNvPicPr>
+            <a:picLocks noChangeAspect="1"/>
+          </p:cNvPicPr>
+          <p:nvPr/>
+        </p:nvPicPr>
+        <p:blipFill>
+          <a:blip r:embed="rId2"/>
+          <a:stretch>
+            <a:fillRect/>
+          </a:stretch>
+        </p:blipFill>
         <p:spPr>
           <a:xfrm>
-            <a:off x="838200" y="1825625"/>
-            <a:ext cx="10653395" cy="4873625"/>
+            <a:off x="838200" y="2415540"/>
+            <a:ext cx="5503545" cy="3679190"/>
           </a:xfrm>
+          <a:prstGeom prst="rect">
+            <a:avLst/>
+          </a:prstGeom>
+          <a:noFill/>
+          <a:ln>
+            <a:noFill/>
+          </a:ln>
         </p:spPr>
-        <p:txBody>
-          <a:bodyPr>
-            <a:normAutofit/>
+      </p:pic>
+      <p:sp>
+        <p:nvSpPr>
+          <p:cNvPr id="13" name="Текстовое поле 12"/>
+          <p:cNvSpPr txBox="1"/>
+          <p:nvPr/>
+        </p:nvSpPr>
+        <p:spPr>
+          <a:xfrm>
+            <a:off x="838200" y="1691005"/>
+            <a:ext cx="4336415" cy="460375"/>
+          </a:xfrm>
+          <a:prstGeom prst="rect">
+            <a:avLst/>
+          </a:prstGeom>
+          <a:noFill/>
+        </p:spPr>
+        <p:txBody>
+          <a:bodyPr wrap="square" rtlCol="0" anchor="t">
+            <a:spAutoFit/>
           </a:bodyPr>
           <a:p>
-            <a:pPr marL="0" indent="0">
-              <a:lnSpc>
-                <a:spcPct val="150000"/>
-              </a:lnSpc>
-              <a:buNone/>
-            </a:pPr>
-            <a:r>
-              <a:rPr lang="ru-RU" altLang="en-US" sz="2500"/>
-              <a:t>WebRTC - </a:t>
-            </a:r>
-            <a:r>
-              <a:rPr lang="en-US" altLang="ru-RU" sz="2500"/>
-              <a:t>стандарт</a:t>
-            </a:r>
-            <a:r>
-              <a:rPr lang="ru-RU" altLang="en-US" sz="2500"/>
-              <a:t>, </a:t>
-            </a:r>
-            <a:r>
-              <a:rPr lang="en-US" altLang="ru-RU" sz="2500"/>
-              <a:t>позволяющий</a:t>
-            </a:r>
-            <a:r>
-              <a:rPr lang="ru-RU" altLang="en-US" sz="2500"/>
-              <a:t>  построить соединение в режиме узел-узел</a:t>
-            </a:r>
-            <a:r>
-              <a:rPr lang="en-US" altLang="ru-RU" sz="2500"/>
-              <a:t>, </a:t>
-            </a:r>
-            <a:r>
-              <a:rPr lang="ru-RU" altLang="en-US" sz="2500"/>
-              <a:t>захватывать и вещать аудио и видео медиа-потоки, а также передавать между браузерами произвольные данные, без обязательного использования посредников. </a:t>
-            </a:r>
-            <a:endParaRPr lang="ru-RU" altLang="en-US"/>
+            <a:r>
+              <a:rPr lang="en-US" altLang="en-US" sz="2400">
+                <a:sym typeface="+mn-ea"/>
+              </a:rPr>
+              <a:t>Создание p2p соединения</a:t>
+            </a:r>
+            <a:endParaRPr lang="en-US" altLang="en-US" sz="2400">
+              <a:sym typeface="+mn-ea"/>
+            </a:endParaRPr>
           </a:p>
         </p:txBody>
       </p:sp>
@@ -7621,16 +6858,16 @@
         <p:spPr/>
         <p:txBody>
           <a:bodyPr>
-            <a:normAutofit fontScale="90000"/>
+            <a:normAutofit/>
           </a:bodyPr>
           <a:p>
             <a:r>
-              <a:rPr lang="ru-RU" altLang="en-US">
-                <a:sym typeface="+mn-ea"/>
-              </a:rPr>
-              <a:t>WebRTC (Web Real-Time Communications) </a:t>
-            </a:r>
-            <a:endParaRPr lang="en-US" altLang="ru-RU">
+              <a:rPr lang="en-US" altLang="en-US" sz="3600">
+                <a:sym typeface="+mn-ea"/>
+              </a:rPr>
+              <a:t>Реализованные функции программы</a:t>
+            </a:r>
+            <a:endParaRPr lang="en-US" altLang="en-US" sz="3600">
               <a:sym typeface="+mn-ea"/>
             </a:endParaRPr>
           </a:p>
@@ -7638,13 +6875,11 @@
       </p:sp>
       <p:pic>
         <p:nvPicPr>
-          <p:cNvPr id="6" name="Изображение 8"/>
+          <p:cNvPr id="7" name="Изображение 18"/>
           <p:cNvPicPr>
             <a:picLocks noChangeAspect="1"/>
           </p:cNvPicPr>
-          <p:nvPr>
-            <p:ph idx="1"/>
-          </p:nvPr>
+          <p:nvPr/>
         </p:nvPicPr>
         <p:blipFill>
           <a:blip r:embed="rId1"/>
@@ -7654,8 +6889,8 @@
         </p:blipFill>
         <p:spPr>
           <a:xfrm>
-            <a:off x="1456690" y="2233930"/>
-            <a:ext cx="9277350" cy="3533775"/>
+            <a:off x="746125" y="2151380"/>
+            <a:ext cx="4846955" cy="1179195"/>
           </a:xfrm>
           <a:prstGeom prst="rect">
             <a:avLst/>
@@ -7666,6 +6901,100 @@
           </a:ln>
         </p:spPr>
       </p:pic>
+      <p:sp>
+        <p:nvSpPr>
+          <p:cNvPr id="8" name="Текстовое поле 7"/>
+          <p:cNvSpPr txBox="1"/>
+          <p:nvPr/>
+        </p:nvSpPr>
+        <p:spPr>
+          <a:xfrm>
+            <a:off x="838200" y="1691005"/>
+            <a:ext cx="5361305" cy="460375"/>
+          </a:xfrm>
+          <a:prstGeom prst="rect">
+            <a:avLst/>
+          </a:prstGeom>
+          <a:noFill/>
+        </p:spPr>
+        <p:txBody>
+          <a:bodyPr wrap="none" rtlCol="0" anchor="t">
+            <a:spAutoFit/>
+          </a:bodyPr>
+          <a:p>
+            <a:r>
+              <a:rPr lang="en-US" altLang="en-US" sz="2400">
+                <a:sym typeface="+mn-ea"/>
+              </a:rPr>
+              <a:t>Создание потока и подписка на него</a:t>
+            </a:r>
+            <a:endParaRPr lang="en-US" altLang="en-US" sz="2400">
+              <a:sym typeface="+mn-ea"/>
+            </a:endParaRPr>
+          </a:p>
+        </p:txBody>
+      </p:sp>
+      <p:pic>
+        <p:nvPicPr>
+          <p:cNvPr id="43" name="Изображение 13"/>
+          <p:cNvPicPr>
+            <a:picLocks noChangeAspect="1"/>
+          </p:cNvPicPr>
+          <p:nvPr/>
+        </p:nvPicPr>
+        <p:blipFill>
+          <a:blip r:embed="rId2"/>
+          <a:stretch>
+            <a:fillRect/>
+          </a:stretch>
+        </p:blipFill>
+        <p:spPr>
+          <a:xfrm>
+            <a:off x="931545" y="4952365"/>
+            <a:ext cx="8696325" cy="1561465"/>
+          </a:xfrm>
+          <a:prstGeom prst="rect">
+            <a:avLst/>
+          </a:prstGeom>
+          <a:noFill/>
+          <a:ln>
+            <a:noFill/>
+          </a:ln>
+        </p:spPr>
+      </p:pic>
+      <p:sp>
+        <p:nvSpPr>
+          <p:cNvPr id="11" name="Текстовое поле 10"/>
+          <p:cNvSpPr txBox="1"/>
+          <p:nvPr/>
+        </p:nvSpPr>
+        <p:spPr>
+          <a:xfrm>
+            <a:off x="931545" y="4507865"/>
+            <a:ext cx="8527415" cy="460375"/>
+          </a:xfrm>
+          <a:prstGeom prst="rect">
+            <a:avLst/>
+          </a:prstGeom>
+          <a:noFill/>
+        </p:spPr>
+        <p:txBody>
+          <a:bodyPr wrap="none" rtlCol="0" anchor="t">
+            <a:spAutoFit/>
+          </a:bodyPr>
+          <a:p>
+            <a:r>
+              <a:rPr lang="en-US" altLang="en-US" sz="2400">
+                <a:sym typeface="+mn-ea"/>
+              </a:rPr>
+              <a:t>Получение информации о медиаустройствах пользователя</a:t>
+            </a:r>
+            <a:endParaRPr lang="en-US" altLang="en-US" sz="2400">
+              <a:sym typeface="+mn-ea"/>
+            </a:endParaRPr>
+          </a:p>
+        </p:txBody>
+      </p:sp>
     </p:spTree>
   </p:cSld>
   <p:clrMapOvr>
@@ -7694,103 +7023,455 @@
             <p:ph type="title"/>
           </p:nvPr>
         </p:nvSpPr>
-        <p:spPr/>
-        <p:txBody>
-          <a:bodyPr/>
-          <a:p>
-            <a:r>
-              <a:rPr lang="en-US" altLang="ru-RU"/>
-              <a:t>STUN</a:t>
-            </a:r>
-            <a:endParaRPr lang="en-US" altLang="ru-RU"/>
-          </a:p>
-        </p:txBody>
-      </p:sp>
-      <p:sp>
-        <p:nvSpPr>
-          <p:cNvPr id="3" name="Замещающее содержимое 2"/>
-          <p:cNvSpPr>
-            <a:spLocks noGrp="1"/>
-          </p:cNvSpPr>
-          <p:nvPr>
-            <p:ph idx="1"/>
-          </p:nvPr>
-        </p:nvSpPr>
         <p:spPr>
           <a:xfrm>
-            <a:off x="838200" y="1825625"/>
-            <a:ext cx="11106150" cy="4351655"/>
+            <a:off x="838200" y="365125"/>
+            <a:ext cx="10515600" cy="673100"/>
           </a:xfrm>
         </p:spPr>
         <p:txBody>
-          <a:bodyPr>
-            <a:noAutofit/>
-          </a:bodyPr>
-          <a:p>
-            <a:pPr marL="0" indent="0">
+          <a:bodyPr/>
+          <a:p>
+            <a:r>
+              <a:rPr lang="" altLang="en-US" sz="3600"/>
+              <a:t>Преимущества</a:t>
+            </a:r>
+            <a:r>
+              <a:rPr lang="en-US" altLang="en-US" sz="3600"/>
+              <a:t> </a:t>
+            </a:r>
+            <a:r>
+              <a:rPr lang="" altLang="en-US" sz="3600"/>
+              <a:t>разработанного видеочата</a:t>
+            </a:r>
+            <a:endParaRPr lang="" altLang="en-US" sz="3600"/>
+          </a:p>
+        </p:txBody>
+      </p:sp>
+      <p:sp>
+        <p:nvSpPr>
+          <p:cNvPr id="3" name="Замещающее содержимое 2"/>
+          <p:cNvSpPr/>
+          <p:nvPr>
+            <p:ph idx="1"/>
+          </p:nvPr>
+        </p:nvSpPr>
+        <p:spPr>
+          <a:xfrm>
+            <a:off x="838200" y="1955165"/>
+            <a:ext cx="10515600" cy="4351338"/>
+          </a:xfrm>
+        </p:spPr>
+        <p:txBody>
+          <a:bodyPr/>
+          <a:p>
+            <a:pPr>
               <a:lnSpc>
                 <a:spcPct val="150000"/>
               </a:lnSpc>
-              <a:buNone/>
             </a:pPr>
             <a:r>
-              <a:rPr sz="2500">
-                <a:sym typeface="+mn-ea"/>
-              </a:rPr>
-              <a:t>STUN </a:t>
-            </a:r>
-            <a:r>
-              <a:rPr sz="2500"/>
-              <a:t>(</a:t>
-            </a:r>
-            <a:r>
-              <a:rPr sz="2500">
-                <a:sym typeface="+mn-ea"/>
-              </a:rPr>
-              <a:t>Session Traversal Utilities for NAT</a:t>
-            </a:r>
-            <a:r>
-              <a:rPr sz="2500"/>
-              <a:t>) </a:t>
-            </a:r>
-            <a:r>
-              <a:rPr lang="en-US" sz="2500"/>
-              <a:t>-</a:t>
-            </a:r>
-            <a:r>
-              <a:rPr sz="2500"/>
-              <a:t> это протокол для нахождения и определения публичного адреса </a:t>
-            </a:r>
-            <a:r>
-              <a:rPr lang="en-US" sz="2500"/>
-              <a:t>устройства </a:t>
-            </a:r>
-            <a:r>
-              <a:rPr sz="2500"/>
-              <a:t>и любых ограничений в маршрутизаторе, которые препятствуют прямому соединению с узлом.</a:t>
-            </a:r>
-            <a:endParaRPr sz="2500"/>
-          </a:p>
-          <a:p>
-            <a:pPr marL="0" indent="0">
+              <a:rPr lang="en-US" altLang="ru-RU" sz="2000">
+                <a:solidFill>
+                  <a:schemeClr val="tx1"/>
+                </a:solidFill>
+              </a:rPr>
+              <a:t>Работает только по HTTPS</a:t>
+            </a:r>
+            <a:endParaRPr lang="en-US" altLang="ru-RU" sz="2000">
+              <a:solidFill>
+                <a:schemeClr val="tx1"/>
+              </a:solidFill>
+            </a:endParaRPr>
+          </a:p>
+          <a:p>
+            <a:pPr>
               <a:lnSpc>
                 <a:spcPct val="150000"/>
               </a:lnSpc>
-              <a:buNone/>
             </a:pPr>
             <a:r>
-              <a:rPr sz="2500"/>
-              <a:t>Клиент </a:t>
-            </a:r>
-            <a:r>
-              <a:rPr lang="" sz="2500"/>
-              <a:t>отправляет </a:t>
-            </a:r>
-            <a:r>
-              <a:rPr sz="2500"/>
-              <a:t>запрос к STUN серверу в интернете, который ответит публичным адресом клиента и, доступен ли, или нет, клиент за NAT маршрутизатором.</a:t>
-            </a:r>
-            <a:endParaRPr sz="2500"/>
+              <a:rPr lang="en-US" altLang="ru-RU" sz="2000">
+                <a:solidFill>
+                  <a:schemeClr val="tx1"/>
+                </a:solidFill>
+              </a:rPr>
+              <a:t>Медиа потоки шифруются (DTLS и SRTP)</a:t>
+            </a:r>
+            <a:endParaRPr lang="en-US" altLang="ru-RU" sz="2000">
+              <a:solidFill>
+                <a:schemeClr val="tx1"/>
+              </a:solidFill>
+            </a:endParaRPr>
+          </a:p>
+          <a:p>
+            <a:pPr>
+              <a:lnSpc>
+                <a:spcPct val="150000"/>
+              </a:lnSpc>
+            </a:pPr>
+            <a:r>
+              <a:rPr lang="en-US" altLang="ru-RU" sz="2000">
+                <a:solidFill>
+                  <a:schemeClr val="tx1"/>
+                </a:solidFill>
+              </a:rPr>
+              <a:t>Технология не требует установки плагинов</a:t>
+            </a:r>
+            <a:endParaRPr lang="en-US" altLang="ru-RU" sz="2000">
+              <a:solidFill>
+                <a:schemeClr val="tx1"/>
+              </a:solidFill>
+            </a:endParaRPr>
+          </a:p>
+          <a:p>
+            <a:pPr>
+              <a:lnSpc>
+                <a:spcPct val="150000"/>
+              </a:lnSpc>
+            </a:pPr>
+            <a:r>
+              <a:rPr lang="en-US" altLang="ru-RU" sz="2000">
+                <a:solidFill>
+                  <a:schemeClr val="tx1"/>
+                </a:solidFill>
+              </a:rPr>
+              <a:t>Не получится сделать шпионское приложение</a:t>
+            </a:r>
+            <a:endParaRPr lang="en-US" altLang="ru-RU" sz="2000">
+              <a:solidFill>
+                <a:schemeClr val="tx1"/>
+              </a:solidFill>
+            </a:endParaRPr>
+          </a:p>
+        </p:txBody>
+      </p:sp>
+      <p:sp>
+        <p:nvSpPr>
+          <p:cNvPr id="4" name="Текстовое поле 3"/>
+          <p:cNvSpPr txBox="1"/>
+          <p:nvPr/>
+        </p:nvSpPr>
+        <p:spPr>
+          <a:xfrm>
+            <a:off x="838200" y="1494790"/>
+            <a:ext cx="2078355" cy="460375"/>
+          </a:xfrm>
+          <a:prstGeom prst="rect">
+            <a:avLst/>
+          </a:prstGeom>
+          <a:noFill/>
+        </p:spPr>
+        <p:txBody>
+          <a:bodyPr wrap="none" rtlCol="0" anchor="t">
+            <a:spAutoFit/>
+          </a:bodyPr>
+          <a:p>
+            <a:r>
+              <a:rPr lang="" sz="2400">
+                <a:sym typeface="+mn-ea"/>
+              </a:rPr>
+              <a:t>Б</a:t>
+            </a:r>
+            <a:r>
+              <a:rPr lang="en-US" altLang="en-US" sz="2400">
+                <a:sym typeface="+mn-ea"/>
+              </a:rPr>
+              <a:t>езопасност</a:t>
+            </a:r>
+            <a:r>
+              <a:rPr lang="" altLang="en-US" sz="2400">
+                <a:sym typeface="+mn-ea"/>
+              </a:rPr>
+              <a:t>ь</a:t>
+            </a:r>
+            <a:endParaRPr lang="" altLang="en-US" sz="2400">
+              <a:sym typeface="+mn-ea"/>
+            </a:endParaRPr>
+          </a:p>
+        </p:txBody>
+      </p:sp>
+      <p:graphicFrame>
+        <p:nvGraphicFramePr>
+          <p:cNvPr id="5" name="Таблица 4"/>
+          <p:cNvGraphicFramePr/>
+          <p:nvPr/>
+        </p:nvGraphicFramePr>
+        <p:xfrm>
+          <a:off x="977900" y="5690870"/>
+          <a:ext cx="9093200" cy="944880"/>
+        </p:xfrm>
+        <a:graphic>
+          <a:graphicData uri="http://schemas.openxmlformats.org/drawingml/2006/table">
+            <a:tbl>
+              <a:tblPr firstRow="1" bandRow="1">
+                <a:effectLst>
+                  <a:outerShdw blurRad="114300" dist="25400" dir="5340000" algn="tl" rotWithShape="0">
+                    <a:prstClr val="black">
+                      <a:alpha val="29000"/>
+                    </a:prstClr>
+                  </a:outerShdw>
+                </a:effectLst>
+                <a:tableStyleId>{5C22544A-7EE6-4342-B048-85BDC9FD1C3A}</a:tableStyleId>
+              </a:tblPr>
+              <a:tblGrid>
+                <a:gridCol w="2273300"/>
+                <a:gridCol w="2273300"/>
+                <a:gridCol w="2273300"/>
+                <a:gridCol w="2273300"/>
+              </a:tblGrid>
+              <a:tr h="472440">
+                <a:tc>
+                  <a:txBody>
+                    <a:bodyPr/>
+                    <a:p>
+                      <a:pPr>
+                        <a:buNone/>
+                      </a:pPr>
+                      <a:r>
+                        <a:rPr lang="en-US" altLang="ru-RU" sz="1800" b="0">
+                          <a:solidFill>
+                            <a:schemeClr val="tx1"/>
+                          </a:solidFill>
+                        </a:rPr>
+                        <a:t>Chrome</a:t>
+                      </a:r>
+                      <a:endParaRPr lang="en-US" altLang="ru-RU" sz="1800" b="0">
+                        <a:solidFill>
+                          <a:schemeClr val="tx1"/>
+                        </a:solidFill>
+                      </a:endParaRPr>
+                    </a:p>
+                  </a:txBody>
+                  <a:tcPr>
+                    <a:noFill/>
+                  </a:tcPr>
+                </a:tc>
+                <a:tc>
+                  <a:txBody>
+                    <a:bodyPr/>
+                    <a:p>
+                      <a:pPr>
+                        <a:buNone/>
+                      </a:pPr>
+                      <a:r>
+                        <a:rPr lang="en-US" altLang="ru-RU" sz="1800" b="0">
+                          <a:solidFill>
+                            <a:schemeClr val="tx1"/>
+                          </a:solidFill>
+                        </a:rPr>
+                        <a:t>Safari</a:t>
+                      </a:r>
+                      <a:endParaRPr lang="en-US" altLang="ru-RU" sz="1800" b="0">
+                        <a:solidFill>
+                          <a:schemeClr val="tx1"/>
+                        </a:solidFill>
+                      </a:endParaRPr>
+                    </a:p>
+                  </a:txBody>
+                  <a:tcPr>
+                    <a:noFill/>
+                  </a:tcPr>
+                </a:tc>
+                <a:tc>
+                  <a:txBody>
+                    <a:bodyPr/>
+                    <a:p>
+                      <a:pPr>
+                        <a:buNone/>
+                      </a:pPr>
+                      <a:r>
+                        <a:rPr lang="en-US" altLang="ru-RU" sz="1800" b="0">
+                          <a:solidFill>
+                            <a:schemeClr val="tx1"/>
+                          </a:solidFill>
+                        </a:rPr>
+                        <a:t>Firefox</a:t>
+                      </a:r>
+                      <a:endParaRPr lang="en-US" altLang="ru-RU" sz="1800" b="0">
+                        <a:solidFill>
+                          <a:schemeClr val="tx1"/>
+                        </a:solidFill>
+                      </a:endParaRPr>
+                    </a:p>
+                  </a:txBody>
+                  <a:tcPr>
+                    <a:noFill/>
+                  </a:tcPr>
+                </a:tc>
+                <a:tc>
+                  <a:txBody>
+                    <a:bodyPr/>
+                    <a:p>
+                      <a:pPr>
+                        <a:buNone/>
+                      </a:pPr>
+                      <a:r>
+                        <a:rPr lang="en-US" altLang="ru-RU" sz="1800" b="0">
+                          <a:solidFill>
+                            <a:schemeClr val="tx1"/>
+                          </a:solidFill>
+                        </a:rPr>
+                        <a:t>Opera</a:t>
+                      </a:r>
+                      <a:endParaRPr lang="en-US" altLang="ru-RU" sz="1800" b="0">
+                        <a:solidFill>
+                          <a:schemeClr val="tx1"/>
+                        </a:solidFill>
+                      </a:endParaRPr>
+                    </a:p>
+                  </a:txBody>
+                  <a:tcPr>
+                    <a:noFill/>
+                  </a:tcPr>
+                </a:tc>
+              </a:tr>
+              <a:tr h="472440">
+                <a:tc>
+                  <a:txBody>
+                    <a:bodyPr/>
+                    <a:p>
+                      <a:pPr>
+                        <a:buNone/>
+                      </a:pPr>
+                      <a:r>
+                        <a:rPr lang="en-US" altLang="ru-RU" sz="1800">
+                          <a:solidFill>
+                            <a:schemeClr val="tx1"/>
+                          </a:solidFill>
+                        </a:rPr>
+                        <a:t>23+</a:t>
+                      </a:r>
+                      <a:endParaRPr lang="en-US" altLang="ru-RU" sz="1800">
+                        <a:solidFill>
+                          <a:schemeClr val="tx1"/>
+                        </a:solidFill>
+                      </a:endParaRPr>
+                    </a:p>
+                  </a:txBody>
+                  <a:tcPr>
+                    <a:noFill/>
+                  </a:tcPr>
+                </a:tc>
+                <a:tc>
+                  <a:txBody>
+                    <a:bodyPr/>
+                    <a:p>
+                      <a:pPr>
+                        <a:buNone/>
+                      </a:pPr>
+                      <a:r>
+                        <a:rPr lang="en-US" altLang="ru-RU" sz="1800">
+                          <a:solidFill>
+                            <a:schemeClr val="tx1"/>
+                          </a:solidFill>
+                        </a:rPr>
+                        <a:t>11+</a:t>
+                      </a:r>
+                      <a:endParaRPr lang="en-US" altLang="ru-RU" sz="1800">
+                        <a:solidFill>
+                          <a:schemeClr val="tx1"/>
+                        </a:solidFill>
+                      </a:endParaRPr>
+                    </a:p>
+                  </a:txBody>
+                  <a:tcPr>
+                    <a:noFill/>
+                  </a:tcPr>
+                </a:tc>
+                <a:tc>
+                  <a:txBody>
+                    <a:bodyPr/>
+                    <a:p>
+                      <a:pPr>
+                        <a:buNone/>
+                      </a:pPr>
+                      <a:r>
+                        <a:rPr lang="en-US" altLang="ru-RU" sz="1800">
+                          <a:solidFill>
+                            <a:schemeClr val="tx1"/>
+                          </a:solidFill>
+                        </a:rPr>
+                        <a:t>38+</a:t>
+                      </a:r>
+                      <a:endParaRPr lang="en-US" altLang="ru-RU" sz="1800">
+                        <a:solidFill>
+                          <a:schemeClr val="tx1"/>
+                        </a:solidFill>
+                      </a:endParaRPr>
+                    </a:p>
+                  </a:txBody>
+                  <a:tcPr>
+                    <a:noFill/>
+                  </a:tcPr>
+                </a:tc>
+                <a:tc>
+                  <a:txBody>
+                    <a:bodyPr/>
+                    <a:p>
+                      <a:pPr>
+                        <a:buNone/>
+                      </a:pPr>
+                      <a:r>
+                        <a:rPr lang="en-US" altLang="ru-RU" sz="1800">
+                          <a:solidFill>
+                            <a:schemeClr val="tx1"/>
+                          </a:solidFill>
+                        </a:rPr>
+                        <a:t>12+</a:t>
+                      </a:r>
+                      <a:endParaRPr lang="en-US" altLang="ru-RU" sz="1800">
+                        <a:solidFill>
+                          <a:schemeClr val="tx1"/>
+                        </a:solidFill>
+                      </a:endParaRPr>
+                    </a:p>
+                  </a:txBody>
+                  <a:tcPr>
+                    <a:noFill/>
+                  </a:tcPr>
+                </a:tc>
+              </a:tr>
+            </a:tbl>
+          </a:graphicData>
+        </a:graphic>
+      </p:graphicFrame>
+      <p:sp>
+        <p:nvSpPr>
+          <p:cNvPr id="6" name="Текстовое поле 5"/>
+          <p:cNvSpPr txBox="1"/>
+          <p:nvPr/>
+        </p:nvSpPr>
+        <p:spPr>
+          <a:xfrm>
+            <a:off x="838200" y="4994910"/>
+            <a:ext cx="3532505" cy="460375"/>
+          </a:xfrm>
+          <a:prstGeom prst="rect">
+            <a:avLst/>
+          </a:prstGeom>
+          <a:noFill/>
+        </p:spPr>
+        <p:txBody>
+          <a:bodyPr wrap="none" rtlCol="0" anchor="t">
+            <a:spAutoFit/>
+          </a:bodyPr>
+          <a:p>
+            <a:r>
+              <a:rPr lang="" sz="2400">
+                <a:sym typeface="+mn-ea"/>
+              </a:rPr>
+              <a:t>К</a:t>
+            </a:r>
+            <a:r>
+              <a:rPr lang="" altLang="en-US" sz="2400">
+                <a:sym typeface="+mn-ea"/>
+              </a:rPr>
+              <a:t>россплатформенность</a:t>
+            </a:r>
+            <a:endParaRPr lang="" altLang="en-US" sz="2400">
+              <a:sym typeface="+mn-ea"/>
+            </a:endParaRPr>
           </a:p>
         </p:txBody>
       </p:sp>

</xml_diff>